<commit_message>
Insert in Registro table Login 100% finished GUI: .-Registro .-Login .-ConsultaRegistro
</commit_message>
<xml_diff>
--- a/SQLite.pptx
+++ b/SQLite.pptx
@@ -6,6 +6,31 @@
   </p:sldMasterIdLst>
   <p:sldIdLst>
     <p:sldId id="256" r:id="rId2"/>
+    <p:sldId id="257" r:id="rId3"/>
+    <p:sldId id="258" r:id="rId4"/>
+    <p:sldId id="259" r:id="rId5"/>
+    <p:sldId id="262" r:id="rId6"/>
+    <p:sldId id="263" r:id="rId7"/>
+    <p:sldId id="264" r:id="rId8"/>
+    <p:sldId id="265" r:id="rId9"/>
+    <p:sldId id="260" r:id="rId10"/>
+    <p:sldId id="261" r:id="rId11"/>
+    <p:sldId id="266" r:id="rId12"/>
+    <p:sldId id="268" r:id="rId13"/>
+    <p:sldId id="267" r:id="rId14"/>
+    <p:sldId id="269" r:id="rId15"/>
+    <p:sldId id="270" r:id="rId16"/>
+    <p:sldId id="278" r:id="rId17"/>
+    <p:sldId id="272" r:id="rId18"/>
+    <p:sldId id="275" r:id="rId19"/>
+    <p:sldId id="273" r:id="rId20"/>
+    <p:sldId id="274" r:id="rId21"/>
+    <p:sldId id="271" r:id="rId22"/>
+    <p:sldId id="277" r:id="rId23"/>
+    <p:sldId id="281" r:id="rId24"/>
+    <p:sldId id="279" r:id="rId25"/>
+    <p:sldId id="280" r:id="rId26"/>
+    <p:sldId id="276" r:id="rId27"/>
   </p:sldIdLst>
   <p:sldSz cx="12192000" cy="6858000"/>
   <p:notesSz cx="6858000" cy="9144000"/>
@@ -3405,6 +3430,2167 @@
 </p:sld>
 </file>
 
+<file path=ppt/slides/slide10.xml><?xml version="1.0" encoding="utf-8"?>
+<p:sld xmlns:a="http://schemas.openxmlformats.org/drawingml/2006/main" xmlns:r="http://schemas.openxmlformats.org/officeDocument/2006/relationships" xmlns:p="http://schemas.openxmlformats.org/presentationml/2006/main">
+  <p:cSld>
+    <p:spTree>
+      <p:nvGrpSpPr>
+        <p:cNvPr id="1" name=""/>
+        <p:cNvGrpSpPr/>
+        <p:nvPr/>
+      </p:nvGrpSpPr>
+      <p:grpSpPr>
+        <a:xfrm>
+          <a:off x="0" y="0"/>
+          <a:ext cx="0" cy="0"/>
+          <a:chOff x="0" y="0"/>
+          <a:chExt cx="0" cy="0"/>
+        </a:xfrm>
+      </p:grpSpPr>
+      <p:sp>
+        <p:nvSpPr>
+          <p:cNvPr id="2" name="Título 1">
+            <a:extLst>
+              <a:ext uri="{FF2B5EF4-FFF2-40B4-BE49-F238E27FC236}">
+                <a16:creationId xmlns:a16="http://schemas.microsoft.com/office/drawing/2014/main" id="{41C6BEED-86DE-4BF4-B156-6B9182F310FB}"/>
+              </a:ext>
+            </a:extLst>
+          </p:cNvPr>
+          <p:cNvSpPr>
+            <a:spLocks noGrp="1"/>
+          </p:cNvSpPr>
+          <p:nvPr>
+            <p:ph type="title"/>
+          </p:nvPr>
+        </p:nvSpPr>
+        <p:spPr/>
+        <p:txBody>
+          <a:bodyPr/>
+          <a:lstStyle/>
+          <a:p>
+            <a:r>
+              <a:rPr lang="es-MX" dirty="0"/>
+              <a:t>iOS</a:t>
+            </a:r>
+          </a:p>
+        </p:txBody>
+      </p:sp>
+      <p:pic>
+        <p:nvPicPr>
+          <p:cNvPr id="4" name="Marcador de contenido 3">
+            <a:extLst>
+              <a:ext uri="{FF2B5EF4-FFF2-40B4-BE49-F238E27FC236}">
+                <a16:creationId xmlns:a16="http://schemas.microsoft.com/office/drawing/2014/main" id="{AF569FB1-F62A-44E7-8394-F22BCFA0D9CC}"/>
+              </a:ext>
+            </a:extLst>
+          </p:cNvPr>
+          <p:cNvPicPr>
+            <a:picLocks noGrp="1" noChangeAspect="1"/>
+          </p:cNvPicPr>
+          <p:nvPr>
+            <p:ph idx="1"/>
+          </p:nvPr>
+        </p:nvPicPr>
+        <p:blipFill>
+          <a:blip r:embed="rId2"/>
+          <a:stretch>
+            <a:fillRect/>
+          </a:stretch>
+        </p:blipFill>
+        <p:spPr>
+          <a:xfrm>
+            <a:off x="2228144" y="1825625"/>
+            <a:ext cx="7735712" cy="4351338"/>
+          </a:xfrm>
+          <a:prstGeom prst="rect">
+            <a:avLst/>
+          </a:prstGeom>
+        </p:spPr>
+      </p:pic>
+    </p:spTree>
+    <p:extLst>
+      <p:ext uri="{BB962C8B-B14F-4D97-AF65-F5344CB8AC3E}">
+        <p14:creationId xmlns:p14="http://schemas.microsoft.com/office/powerpoint/2010/main" val="468731933"/>
+      </p:ext>
+    </p:extLst>
+  </p:cSld>
+  <p:clrMapOvr>
+    <a:masterClrMapping/>
+  </p:clrMapOvr>
+</p:sld>
+</file>
+
+<file path=ppt/slides/slide11.xml><?xml version="1.0" encoding="utf-8"?>
+<p:sld xmlns:a="http://schemas.openxmlformats.org/drawingml/2006/main" xmlns:r="http://schemas.openxmlformats.org/officeDocument/2006/relationships" xmlns:p="http://schemas.openxmlformats.org/presentationml/2006/main">
+  <p:cSld>
+    <p:spTree>
+      <p:nvGrpSpPr>
+        <p:cNvPr id="1" name=""/>
+        <p:cNvGrpSpPr/>
+        <p:nvPr/>
+      </p:nvGrpSpPr>
+      <p:grpSpPr>
+        <a:xfrm>
+          <a:off x="0" y="0"/>
+          <a:ext cx="0" cy="0"/>
+          <a:chOff x="0" y="0"/>
+          <a:chExt cx="0" cy="0"/>
+        </a:xfrm>
+      </p:grpSpPr>
+      <p:sp>
+        <p:nvSpPr>
+          <p:cNvPr id="2" name="Título 1">
+            <a:extLst>
+              <a:ext uri="{FF2B5EF4-FFF2-40B4-BE49-F238E27FC236}">
+                <a16:creationId xmlns:a16="http://schemas.microsoft.com/office/drawing/2014/main" id="{ABC0A244-9020-4F4D-876A-D6B19EFB6538}"/>
+              </a:ext>
+            </a:extLst>
+          </p:cNvPr>
+          <p:cNvSpPr>
+            <a:spLocks noGrp="1"/>
+          </p:cNvSpPr>
+          <p:nvPr>
+            <p:ph type="title"/>
+          </p:nvPr>
+        </p:nvSpPr>
+        <p:spPr/>
+        <p:txBody>
+          <a:bodyPr/>
+          <a:lstStyle/>
+          <a:p>
+            <a:endParaRPr lang="es-MX"/>
+          </a:p>
+        </p:txBody>
+      </p:sp>
+      <p:pic>
+        <p:nvPicPr>
+          <p:cNvPr id="8" name="Marcador de contenido 7">
+            <a:extLst>
+              <a:ext uri="{FF2B5EF4-FFF2-40B4-BE49-F238E27FC236}">
+                <a16:creationId xmlns:a16="http://schemas.microsoft.com/office/drawing/2014/main" id="{53417D90-7027-4AD0-B48B-99DB776A03C2}"/>
+              </a:ext>
+            </a:extLst>
+          </p:cNvPr>
+          <p:cNvPicPr>
+            <a:picLocks noGrp="1" noChangeAspect="1"/>
+          </p:cNvPicPr>
+          <p:nvPr>
+            <p:ph idx="1"/>
+          </p:nvPr>
+        </p:nvPicPr>
+        <p:blipFill>
+          <a:blip r:embed="rId2"/>
+          <a:stretch>
+            <a:fillRect/>
+          </a:stretch>
+        </p:blipFill>
+        <p:spPr>
+          <a:xfrm>
+            <a:off x="2228144" y="1825625"/>
+            <a:ext cx="7735712" cy="4351338"/>
+          </a:xfrm>
+          <a:prstGeom prst="rect">
+            <a:avLst/>
+          </a:prstGeom>
+        </p:spPr>
+      </p:pic>
+    </p:spTree>
+    <p:extLst>
+      <p:ext uri="{BB962C8B-B14F-4D97-AF65-F5344CB8AC3E}">
+        <p14:creationId xmlns:p14="http://schemas.microsoft.com/office/powerpoint/2010/main" val="2827289273"/>
+      </p:ext>
+    </p:extLst>
+  </p:cSld>
+  <p:clrMapOvr>
+    <a:masterClrMapping/>
+  </p:clrMapOvr>
+</p:sld>
+</file>
+
+<file path=ppt/slides/slide12.xml><?xml version="1.0" encoding="utf-8"?>
+<p:sld xmlns:a="http://schemas.openxmlformats.org/drawingml/2006/main" xmlns:r="http://schemas.openxmlformats.org/officeDocument/2006/relationships" xmlns:p="http://schemas.openxmlformats.org/presentationml/2006/main">
+  <p:cSld>
+    <p:spTree>
+      <p:nvGrpSpPr>
+        <p:cNvPr id="1" name=""/>
+        <p:cNvGrpSpPr/>
+        <p:nvPr/>
+      </p:nvGrpSpPr>
+      <p:grpSpPr>
+        <a:xfrm>
+          <a:off x="0" y="0"/>
+          <a:ext cx="0" cy="0"/>
+          <a:chOff x="0" y="0"/>
+          <a:chExt cx="0" cy="0"/>
+        </a:xfrm>
+      </p:grpSpPr>
+      <p:sp>
+        <p:nvSpPr>
+          <p:cNvPr id="2" name="Título 1">
+            <a:extLst>
+              <a:ext uri="{FF2B5EF4-FFF2-40B4-BE49-F238E27FC236}">
+                <a16:creationId xmlns:a16="http://schemas.microsoft.com/office/drawing/2014/main" id="{5501381A-07EF-4731-B493-0FCA216BCD7C}"/>
+              </a:ext>
+            </a:extLst>
+          </p:cNvPr>
+          <p:cNvSpPr>
+            <a:spLocks noGrp="1"/>
+          </p:cNvSpPr>
+          <p:nvPr>
+            <p:ph type="title"/>
+          </p:nvPr>
+        </p:nvSpPr>
+        <p:spPr/>
+        <p:txBody>
+          <a:bodyPr/>
+          <a:lstStyle/>
+          <a:p>
+            <a:r>
+              <a:rPr lang="es-MX" dirty="0"/>
+              <a:t>Compartido</a:t>
+            </a:r>
+          </a:p>
+        </p:txBody>
+      </p:sp>
+      <p:sp>
+        <p:nvSpPr>
+          <p:cNvPr id="3" name="Marcador de contenido 2">
+            <a:extLst>
+              <a:ext uri="{FF2B5EF4-FFF2-40B4-BE49-F238E27FC236}">
+                <a16:creationId xmlns:a16="http://schemas.microsoft.com/office/drawing/2014/main" id="{722F1CFF-EC68-498E-82AD-93B02860A119}"/>
+              </a:ext>
+            </a:extLst>
+          </p:cNvPr>
+          <p:cNvSpPr>
+            <a:spLocks noGrp="1"/>
+          </p:cNvSpPr>
+          <p:nvPr>
+            <p:ph idx="1"/>
+          </p:nvPr>
+        </p:nvSpPr>
+        <p:spPr/>
+        <p:txBody>
+          <a:bodyPr/>
+          <a:lstStyle/>
+          <a:p>
+            <a:endParaRPr lang="es-MX"/>
+          </a:p>
+        </p:txBody>
+      </p:sp>
+    </p:spTree>
+    <p:extLst>
+      <p:ext uri="{BB962C8B-B14F-4D97-AF65-F5344CB8AC3E}">
+        <p14:creationId xmlns:p14="http://schemas.microsoft.com/office/powerpoint/2010/main" val="2596507790"/>
+      </p:ext>
+    </p:extLst>
+  </p:cSld>
+  <p:clrMapOvr>
+    <a:masterClrMapping/>
+  </p:clrMapOvr>
+</p:sld>
+</file>
+
+<file path=ppt/slides/slide13.xml><?xml version="1.0" encoding="utf-8"?>
+<p:sld xmlns:a="http://schemas.openxmlformats.org/drawingml/2006/main" xmlns:r="http://schemas.openxmlformats.org/officeDocument/2006/relationships" xmlns:p="http://schemas.openxmlformats.org/presentationml/2006/main">
+  <p:cSld>
+    <p:spTree>
+      <p:nvGrpSpPr>
+        <p:cNvPr id="1" name=""/>
+        <p:cNvGrpSpPr/>
+        <p:nvPr/>
+      </p:nvGrpSpPr>
+      <p:grpSpPr>
+        <a:xfrm>
+          <a:off x="0" y="0"/>
+          <a:ext cx="0" cy="0"/>
+          <a:chOff x="0" y="0"/>
+          <a:chExt cx="0" cy="0"/>
+        </a:xfrm>
+      </p:grpSpPr>
+      <p:sp>
+        <p:nvSpPr>
+          <p:cNvPr id="2" name="Título 1">
+            <a:extLst>
+              <a:ext uri="{FF2B5EF4-FFF2-40B4-BE49-F238E27FC236}">
+                <a16:creationId xmlns:a16="http://schemas.microsoft.com/office/drawing/2014/main" id="{786CFBBA-4FB7-4C48-B68B-74A73EA55167}"/>
+              </a:ext>
+            </a:extLst>
+          </p:cNvPr>
+          <p:cNvSpPr>
+            <a:spLocks noGrp="1"/>
+          </p:cNvSpPr>
+          <p:nvPr>
+            <p:ph type="title"/>
+          </p:nvPr>
+        </p:nvSpPr>
+        <p:spPr/>
+        <p:txBody>
+          <a:bodyPr/>
+          <a:lstStyle/>
+          <a:p>
+            <a:endParaRPr lang="es-MX"/>
+          </a:p>
+        </p:txBody>
+      </p:sp>
+      <p:pic>
+        <p:nvPicPr>
+          <p:cNvPr id="4" name="Marcador de contenido 3">
+            <a:extLst>
+              <a:ext uri="{FF2B5EF4-FFF2-40B4-BE49-F238E27FC236}">
+                <a16:creationId xmlns:a16="http://schemas.microsoft.com/office/drawing/2014/main" id="{E73D8D58-89A0-423C-BAA7-9AD55DB7F59D}"/>
+              </a:ext>
+            </a:extLst>
+          </p:cNvPr>
+          <p:cNvPicPr>
+            <a:picLocks noGrp="1" noChangeAspect="1"/>
+          </p:cNvPicPr>
+          <p:nvPr>
+            <p:ph idx="1"/>
+          </p:nvPr>
+        </p:nvPicPr>
+        <p:blipFill>
+          <a:blip r:embed="rId2"/>
+          <a:stretch>
+            <a:fillRect/>
+          </a:stretch>
+        </p:blipFill>
+        <p:spPr>
+          <a:xfrm>
+            <a:off x="2228144" y="1825625"/>
+            <a:ext cx="7735712" cy="4351338"/>
+          </a:xfrm>
+          <a:prstGeom prst="rect">
+            <a:avLst/>
+          </a:prstGeom>
+        </p:spPr>
+      </p:pic>
+    </p:spTree>
+    <p:extLst>
+      <p:ext uri="{BB962C8B-B14F-4D97-AF65-F5344CB8AC3E}">
+        <p14:creationId xmlns:p14="http://schemas.microsoft.com/office/powerpoint/2010/main" val="3367194616"/>
+      </p:ext>
+    </p:extLst>
+  </p:cSld>
+  <p:clrMapOvr>
+    <a:masterClrMapping/>
+  </p:clrMapOvr>
+</p:sld>
+</file>
+
+<file path=ppt/slides/slide14.xml><?xml version="1.0" encoding="utf-8"?>
+<p:sld xmlns:a="http://schemas.openxmlformats.org/drawingml/2006/main" xmlns:r="http://schemas.openxmlformats.org/officeDocument/2006/relationships" xmlns:p="http://schemas.openxmlformats.org/presentationml/2006/main">
+  <p:cSld>
+    <p:spTree>
+      <p:nvGrpSpPr>
+        <p:cNvPr id="1" name=""/>
+        <p:cNvGrpSpPr/>
+        <p:nvPr/>
+      </p:nvGrpSpPr>
+      <p:grpSpPr>
+        <a:xfrm>
+          <a:off x="0" y="0"/>
+          <a:ext cx="0" cy="0"/>
+          <a:chOff x="0" y="0"/>
+          <a:chExt cx="0" cy="0"/>
+        </a:xfrm>
+      </p:grpSpPr>
+      <p:sp>
+        <p:nvSpPr>
+          <p:cNvPr id="2" name="Título 1">
+            <a:extLst>
+              <a:ext uri="{FF2B5EF4-FFF2-40B4-BE49-F238E27FC236}">
+                <a16:creationId xmlns:a16="http://schemas.microsoft.com/office/drawing/2014/main" id="{AFB41BFD-8171-4C43-A272-A3EBDAE80EB1}"/>
+              </a:ext>
+            </a:extLst>
+          </p:cNvPr>
+          <p:cNvSpPr>
+            <a:spLocks noGrp="1"/>
+          </p:cNvSpPr>
+          <p:nvPr>
+            <p:ph type="title"/>
+          </p:nvPr>
+        </p:nvSpPr>
+        <p:spPr/>
+        <p:txBody>
+          <a:bodyPr/>
+          <a:lstStyle/>
+          <a:p>
+            <a:endParaRPr lang="es-MX"/>
+          </a:p>
+        </p:txBody>
+      </p:sp>
+      <p:pic>
+        <p:nvPicPr>
+          <p:cNvPr id="4" name="Marcador de contenido 3">
+            <a:extLst>
+              <a:ext uri="{FF2B5EF4-FFF2-40B4-BE49-F238E27FC236}">
+                <a16:creationId xmlns:a16="http://schemas.microsoft.com/office/drawing/2014/main" id="{DF8751BD-F6F5-49B9-9884-784CFB89AE23}"/>
+              </a:ext>
+            </a:extLst>
+          </p:cNvPr>
+          <p:cNvPicPr>
+            <a:picLocks noGrp="1" noChangeAspect="1"/>
+          </p:cNvPicPr>
+          <p:nvPr>
+            <p:ph idx="1"/>
+          </p:nvPr>
+        </p:nvPicPr>
+        <p:blipFill>
+          <a:blip r:embed="rId2"/>
+          <a:stretch>
+            <a:fillRect/>
+          </a:stretch>
+        </p:blipFill>
+        <p:spPr>
+          <a:xfrm>
+            <a:off x="2228144" y="1825625"/>
+            <a:ext cx="7735712" cy="4351338"/>
+          </a:xfrm>
+          <a:prstGeom prst="rect">
+            <a:avLst/>
+          </a:prstGeom>
+        </p:spPr>
+      </p:pic>
+    </p:spTree>
+    <p:extLst>
+      <p:ext uri="{BB962C8B-B14F-4D97-AF65-F5344CB8AC3E}">
+        <p14:creationId xmlns:p14="http://schemas.microsoft.com/office/powerpoint/2010/main" val="3038442874"/>
+      </p:ext>
+    </p:extLst>
+  </p:cSld>
+  <p:clrMapOvr>
+    <a:masterClrMapping/>
+  </p:clrMapOvr>
+</p:sld>
+</file>
+
+<file path=ppt/slides/slide15.xml><?xml version="1.0" encoding="utf-8"?>
+<p:sld xmlns:a="http://schemas.openxmlformats.org/drawingml/2006/main" xmlns:r="http://schemas.openxmlformats.org/officeDocument/2006/relationships" xmlns:p="http://schemas.openxmlformats.org/presentationml/2006/main">
+  <p:cSld>
+    <p:spTree>
+      <p:nvGrpSpPr>
+        <p:cNvPr id="1" name=""/>
+        <p:cNvGrpSpPr/>
+        <p:nvPr/>
+      </p:nvGrpSpPr>
+      <p:grpSpPr>
+        <a:xfrm>
+          <a:off x="0" y="0"/>
+          <a:ext cx="0" cy="0"/>
+          <a:chOff x="0" y="0"/>
+          <a:chExt cx="0" cy="0"/>
+        </a:xfrm>
+      </p:grpSpPr>
+      <p:sp>
+        <p:nvSpPr>
+          <p:cNvPr id="2" name="Título 1">
+            <a:extLst>
+              <a:ext uri="{FF2B5EF4-FFF2-40B4-BE49-F238E27FC236}">
+                <a16:creationId xmlns:a16="http://schemas.microsoft.com/office/drawing/2014/main" id="{41CA6BD2-2988-4668-9715-2D5DA9B443D8}"/>
+              </a:ext>
+            </a:extLst>
+          </p:cNvPr>
+          <p:cNvSpPr>
+            <a:spLocks noGrp="1"/>
+          </p:cNvSpPr>
+          <p:nvPr>
+            <p:ph type="title"/>
+          </p:nvPr>
+        </p:nvSpPr>
+        <p:spPr/>
+        <p:txBody>
+          <a:bodyPr/>
+          <a:lstStyle/>
+          <a:p>
+            <a:endParaRPr lang="es-MX"/>
+          </a:p>
+        </p:txBody>
+      </p:sp>
+      <p:pic>
+        <p:nvPicPr>
+          <p:cNvPr id="4" name="Marcador de contenido 3">
+            <a:extLst>
+              <a:ext uri="{FF2B5EF4-FFF2-40B4-BE49-F238E27FC236}">
+                <a16:creationId xmlns:a16="http://schemas.microsoft.com/office/drawing/2014/main" id="{0DA98507-BB54-4236-AB31-D8C74C77CB15}"/>
+              </a:ext>
+            </a:extLst>
+          </p:cNvPr>
+          <p:cNvPicPr>
+            <a:picLocks noGrp="1" noChangeAspect="1"/>
+          </p:cNvPicPr>
+          <p:nvPr>
+            <p:ph idx="1"/>
+          </p:nvPr>
+        </p:nvPicPr>
+        <p:blipFill>
+          <a:blip r:embed="rId2"/>
+          <a:stretch>
+            <a:fillRect/>
+          </a:stretch>
+        </p:blipFill>
+        <p:spPr>
+          <a:xfrm>
+            <a:off x="2228144" y="1825625"/>
+            <a:ext cx="7735712" cy="4351338"/>
+          </a:xfrm>
+          <a:prstGeom prst="rect">
+            <a:avLst/>
+          </a:prstGeom>
+        </p:spPr>
+      </p:pic>
+    </p:spTree>
+    <p:extLst>
+      <p:ext uri="{BB962C8B-B14F-4D97-AF65-F5344CB8AC3E}">
+        <p14:creationId xmlns:p14="http://schemas.microsoft.com/office/powerpoint/2010/main" val="1829441903"/>
+      </p:ext>
+    </p:extLst>
+  </p:cSld>
+  <p:clrMapOvr>
+    <a:masterClrMapping/>
+  </p:clrMapOvr>
+</p:sld>
+</file>
+
+<file path=ppt/slides/slide16.xml><?xml version="1.0" encoding="utf-8"?>
+<p:sld xmlns:a="http://schemas.openxmlformats.org/drawingml/2006/main" xmlns:r="http://schemas.openxmlformats.org/officeDocument/2006/relationships" xmlns:p="http://schemas.openxmlformats.org/presentationml/2006/main">
+  <p:cSld>
+    <p:spTree>
+      <p:nvGrpSpPr>
+        <p:cNvPr id="1" name=""/>
+        <p:cNvGrpSpPr/>
+        <p:nvPr/>
+      </p:nvGrpSpPr>
+      <p:grpSpPr>
+        <a:xfrm>
+          <a:off x="0" y="0"/>
+          <a:ext cx="0" cy="0"/>
+          <a:chOff x="0" y="0"/>
+          <a:chExt cx="0" cy="0"/>
+        </a:xfrm>
+      </p:grpSpPr>
+      <p:sp>
+        <p:nvSpPr>
+          <p:cNvPr id="2" name="Título 1">
+            <a:extLst>
+              <a:ext uri="{FF2B5EF4-FFF2-40B4-BE49-F238E27FC236}">
+                <a16:creationId xmlns:a16="http://schemas.microsoft.com/office/drawing/2014/main" id="{5E6C4FF5-F4CB-476A-86A0-62AEBB65F696}"/>
+              </a:ext>
+            </a:extLst>
+          </p:cNvPr>
+          <p:cNvSpPr>
+            <a:spLocks noGrp="1"/>
+          </p:cNvSpPr>
+          <p:nvPr>
+            <p:ph type="title"/>
+          </p:nvPr>
+        </p:nvSpPr>
+        <p:spPr/>
+        <p:txBody>
+          <a:bodyPr/>
+          <a:lstStyle/>
+          <a:p>
+            <a:endParaRPr lang="es-MX"/>
+          </a:p>
+        </p:txBody>
+      </p:sp>
+      <p:pic>
+        <p:nvPicPr>
+          <p:cNvPr id="7" name="Marcador de contenido 6">
+            <a:extLst>
+              <a:ext uri="{FF2B5EF4-FFF2-40B4-BE49-F238E27FC236}">
+                <a16:creationId xmlns:a16="http://schemas.microsoft.com/office/drawing/2014/main" id="{C380A220-592C-4CD7-B178-1DE2C76253C0}"/>
+              </a:ext>
+            </a:extLst>
+          </p:cNvPr>
+          <p:cNvPicPr>
+            <a:picLocks noGrp="1" noChangeAspect="1"/>
+          </p:cNvPicPr>
+          <p:nvPr>
+            <p:ph idx="1"/>
+          </p:nvPr>
+        </p:nvPicPr>
+        <p:blipFill>
+          <a:blip r:embed="rId2"/>
+          <a:stretch>
+            <a:fillRect/>
+          </a:stretch>
+        </p:blipFill>
+        <p:spPr>
+          <a:xfrm>
+            <a:off x="2228144" y="1825625"/>
+            <a:ext cx="7735712" cy="4351338"/>
+          </a:xfrm>
+          <a:prstGeom prst="rect">
+            <a:avLst/>
+          </a:prstGeom>
+        </p:spPr>
+      </p:pic>
+    </p:spTree>
+    <p:extLst>
+      <p:ext uri="{BB962C8B-B14F-4D97-AF65-F5344CB8AC3E}">
+        <p14:creationId xmlns:p14="http://schemas.microsoft.com/office/powerpoint/2010/main" val="2252948756"/>
+      </p:ext>
+    </p:extLst>
+  </p:cSld>
+  <p:clrMapOvr>
+    <a:masterClrMapping/>
+  </p:clrMapOvr>
+</p:sld>
+</file>
+
+<file path=ppt/slides/slide17.xml><?xml version="1.0" encoding="utf-8"?>
+<p:sld xmlns:a="http://schemas.openxmlformats.org/drawingml/2006/main" xmlns:r="http://schemas.openxmlformats.org/officeDocument/2006/relationships" xmlns:p="http://schemas.openxmlformats.org/presentationml/2006/main">
+  <p:cSld>
+    <p:spTree>
+      <p:nvGrpSpPr>
+        <p:cNvPr id="1" name=""/>
+        <p:cNvGrpSpPr/>
+        <p:nvPr/>
+      </p:nvGrpSpPr>
+      <p:grpSpPr>
+        <a:xfrm>
+          <a:off x="0" y="0"/>
+          <a:ext cx="0" cy="0"/>
+          <a:chOff x="0" y="0"/>
+          <a:chExt cx="0" cy="0"/>
+        </a:xfrm>
+      </p:grpSpPr>
+      <p:sp>
+        <p:nvSpPr>
+          <p:cNvPr id="2" name="Título 1">
+            <a:extLst>
+              <a:ext uri="{FF2B5EF4-FFF2-40B4-BE49-F238E27FC236}">
+                <a16:creationId xmlns:a16="http://schemas.microsoft.com/office/drawing/2014/main" id="{98E33AF7-FD0F-45F9-A89F-44497246D48E}"/>
+              </a:ext>
+            </a:extLst>
+          </p:cNvPr>
+          <p:cNvSpPr>
+            <a:spLocks noGrp="1"/>
+          </p:cNvSpPr>
+          <p:nvPr>
+            <p:ph type="title"/>
+          </p:nvPr>
+        </p:nvSpPr>
+        <p:spPr/>
+        <p:txBody>
+          <a:bodyPr/>
+          <a:lstStyle/>
+          <a:p>
+            <a:endParaRPr lang="es-MX"/>
+          </a:p>
+        </p:txBody>
+      </p:sp>
+      <p:pic>
+        <p:nvPicPr>
+          <p:cNvPr id="4" name="Marcador de contenido 3">
+            <a:extLst>
+              <a:ext uri="{FF2B5EF4-FFF2-40B4-BE49-F238E27FC236}">
+                <a16:creationId xmlns:a16="http://schemas.microsoft.com/office/drawing/2014/main" id="{9F5CEF6F-8CFD-4722-AAE6-A7E854618B72}"/>
+              </a:ext>
+            </a:extLst>
+          </p:cNvPr>
+          <p:cNvPicPr>
+            <a:picLocks noGrp="1" noChangeAspect="1"/>
+          </p:cNvPicPr>
+          <p:nvPr>
+            <p:ph idx="1"/>
+          </p:nvPr>
+        </p:nvPicPr>
+        <p:blipFill>
+          <a:blip r:embed="rId2"/>
+          <a:stretch>
+            <a:fillRect/>
+          </a:stretch>
+        </p:blipFill>
+        <p:spPr>
+          <a:xfrm>
+            <a:off x="2228144" y="1825625"/>
+            <a:ext cx="7735712" cy="4351338"/>
+          </a:xfrm>
+          <a:prstGeom prst="rect">
+            <a:avLst/>
+          </a:prstGeom>
+        </p:spPr>
+      </p:pic>
+    </p:spTree>
+    <p:extLst>
+      <p:ext uri="{BB962C8B-B14F-4D97-AF65-F5344CB8AC3E}">
+        <p14:creationId xmlns:p14="http://schemas.microsoft.com/office/powerpoint/2010/main" val="3659781390"/>
+      </p:ext>
+    </p:extLst>
+  </p:cSld>
+  <p:clrMapOvr>
+    <a:masterClrMapping/>
+  </p:clrMapOvr>
+</p:sld>
+</file>
+
+<file path=ppt/slides/slide18.xml><?xml version="1.0" encoding="utf-8"?>
+<p:sld xmlns:a="http://schemas.openxmlformats.org/drawingml/2006/main" xmlns:r="http://schemas.openxmlformats.org/officeDocument/2006/relationships" xmlns:p="http://schemas.openxmlformats.org/presentationml/2006/main">
+  <p:cSld>
+    <p:spTree>
+      <p:nvGrpSpPr>
+        <p:cNvPr id="1" name=""/>
+        <p:cNvGrpSpPr/>
+        <p:nvPr/>
+      </p:nvGrpSpPr>
+      <p:grpSpPr>
+        <a:xfrm>
+          <a:off x="0" y="0"/>
+          <a:ext cx="0" cy="0"/>
+          <a:chOff x="0" y="0"/>
+          <a:chExt cx="0" cy="0"/>
+        </a:xfrm>
+      </p:grpSpPr>
+      <p:sp>
+        <p:nvSpPr>
+          <p:cNvPr id="2" name="Título 1">
+            <a:extLst>
+              <a:ext uri="{FF2B5EF4-FFF2-40B4-BE49-F238E27FC236}">
+                <a16:creationId xmlns:a16="http://schemas.microsoft.com/office/drawing/2014/main" id="{049DF97F-9B48-4719-9552-169EAC205587}"/>
+              </a:ext>
+            </a:extLst>
+          </p:cNvPr>
+          <p:cNvSpPr>
+            <a:spLocks noGrp="1"/>
+          </p:cNvSpPr>
+          <p:nvPr>
+            <p:ph type="title"/>
+          </p:nvPr>
+        </p:nvSpPr>
+        <p:spPr/>
+        <p:txBody>
+          <a:bodyPr/>
+          <a:lstStyle/>
+          <a:p>
+            <a:endParaRPr lang="es-MX"/>
+          </a:p>
+        </p:txBody>
+      </p:sp>
+      <p:pic>
+        <p:nvPicPr>
+          <p:cNvPr id="4" name="Marcador de contenido 3">
+            <a:extLst>
+              <a:ext uri="{FF2B5EF4-FFF2-40B4-BE49-F238E27FC236}">
+                <a16:creationId xmlns:a16="http://schemas.microsoft.com/office/drawing/2014/main" id="{20B59510-A38F-4CB6-BDCC-7EA9735FA683}"/>
+              </a:ext>
+            </a:extLst>
+          </p:cNvPr>
+          <p:cNvPicPr>
+            <a:picLocks noGrp="1" noChangeAspect="1"/>
+          </p:cNvPicPr>
+          <p:nvPr>
+            <p:ph idx="1"/>
+          </p:nvPr>
+        </p:nvPicPr>
+        <p:blipFill>
+          <a:blip r:embed="rId2"/>
+          <a:stretch>
+            <a:fillRect/>
+          </a:stretch>
+        </p:blipFill>
+        <p:spPr>
+          <a:xfrm>
+            <a:off x="2228144" y="1825625"/>
+            <a:ext cx="7735712" cy="4351338"/>
+          </a:xfrm>
+          <a:prstGeom prst="rect">
+            <a:avLst/>
+          </a:prstGeom>
+        </p:spPr>
+      </p:pic>
+    </p:spTree>
+    <p:extLst>
+      <p:ext uri="{BB962C8B-B14F-4D97-AF65-F5344CB8AC3E}">
+        <p14:creationId xmlns:p14="http://schemas.microsoft.com/office/powerpoint/2010/main" val="2855310795"/>
+      </p:ext>
+    </p:extLst>
+  </p:cSld>
+  <p:clrMapOvr>
+    <a:masterClrMapping/>
+  </p:clrMapOvr>
+</p:sld>
+</file>
+
+<file path=ppt/slides/slide19.xml><?xml version="1.0" encoding="utf-8"?>
+<p:sld xmlns:a="http://schemas.openxmlformats.org/drawingml/2006/main" xmlns:r="http://schemas.openxmlformats.org/officeDocument/2006/relationships" xmlns:p="http://schemas.openxmlformats.org/presentationml/2006/main">
+  <p:cSld>
+    <p:spTree>
+      <p:nvGrpSpPr>
+        <p:cNvPr id="1" name=""/>
+        <p:cNvGrpSpPr/>
+        <p:nvPr/>
+      </p:nvGrpSpPr>
+      <p:grpSpPr>
+        <a:xfrm>
+          <a:off x="0" y="0"/>
+          <a:ext cx="0" cy="0"/>
+          <a:chOff x="0" y="0"/>
+          <a:chExt cx="0" cy="0"/>
+        </a:xfrm>
+      </p:grpSpPr>
+      <p:sp>
+        <p:nvSpPr>
+          <p:cNvPr id="2" name="Título 1">
+            <a:extLst>
+              <a:ext uri="{FF2B5EF4-FFF2-40B4-BE49-F238E27FC236}">
+                <a16:creationId xmlns:a16="http://schemas.microsoft.com/office/drawing/2014/main" id="{37378E8C-CB2E-44AA-AC2B-CEFF5F1DC24B}"/>
+              </a:ext>
+            </a:extLst>
+          </p:cNvPr>
+          <p:cNvSpPr>
+            <a:spLocks noGrp="1"/>
+          </p:cNvSpPr>
+          <p:nvPr>
+            <p:ph type="title"/>
+          </p:nvPr>
+        </p:nvSpPr>
+        <p:spPr/>
+        <p:txBody>
+          <a:bodyPr/>
+          <a:lstStyle/>
+          <a:p>
+            <a:endParaRPr lang="es-MX"/>
+          </a:p>
+        </p:txBody>
+      </p:sp>
+      <p:pic>
+        <p:nvPicPr>
+          <p:cNvPr id="4" name="Marcador de contenido 3">
+            <a:extLst>
+              <a:ext uri="{FF2B5EF4-FFF2-40B4-BE49-F238E27FC236}">
+                <a16:creationId xmlns:a16="http://schemas.microsoft.com/office/drawing/2014/main" id="{436265E1-9C06-4D5C-A318-08E3E5FF85CE}"/>
+              </a:ext>
+            </a:extLst>
+          </p:cNvPr>
+          <p:cNvPicPr>
+            <a:picLocks noGrp="1" noChangeAspect="1"/>
+          </p:cNvPicPr>
+          <p:nvPr>
+            <p:ph idx="1"/>
+          </p:nvPr>
+        </p:nvPicPr>
+        <p:blipFill>
+          <a:blip r:embed="rId2"/>
+          <a:stretch>
+            <a:fillRect/>
+          </a:stretch>
+        </p:blipFill>
+        <p:spPr>
+          <a:xfrm>
+            <a:off x="2228144" y="1825625"/>
+            <a:ext cx="7735712" cy="4351338"/>
+          </a:xfrm>
+          <a:prstGeom prst="rect">
+            <a:avLst/>
+          </a:prstGeom>
+        </p:spPr>
+      </p:pic>
+    </p:spTree>
+    <p:extLst>
+      <p:ext uri="{BB962C8B-B14F-4D97-AF65-F5344CB8AC3E}">
+        <p14:creationId xmlns:p14="http://schemas.microsoft.com/office/powerpoint/2010/main" val="2239562920"/>
+      </p:ext>
+    </p:extLst>
+  </p:cSld>
+  <p:clrMapOvr>
+    <a:masterClrMapping/>
+  </p:clrMapOvr>
+</p:sld>
+</file>
+
+<file path=ppt/slides/slide2.xml><?xml version="1.0" encoding="utf-8"?>
+<p:sld xmlns:a="http://schemas.openxmlformats.org/drawingml/2006/main" xmlns:r="http://schemas.openxmlformats.org/officeDocument/2006/relationships" xmlns:p="http://schemas.openxmlformats.org/presentationml/2006/main">
+  <p:cSld>
+    <p:spTree>
+      <p:nvGrpSpPr>
+        <p:cNvPr id="1" name=""/>
+        <p:cNvGrpSpPr/>
+        <p:nvPr/>
+      </p:nvGrpSpPr>
+      <p:grpSpPr>
+        <a:xfrm>
+          <a:off x="0" y="0"/>
+          <a:ext cx="0" cy="0"/>
+          <a:chOff x="0" y="0"/>
+          <a:chExt cx="0" cy="0"/>
+        </a:xfrm>
+      </p:grpSpPr>
+      <p:sp>
+        <p:nvSpPr>
+          <p:cNvPr id="2" name="Título 1">
+            <a:extLst>
+              <a:ext uri="{FF2B5EF4-FFF2-40B4-BE49-F238E27FC236}">
+                <a16:creationId xmlns:a16="http://schemas.microsoft.com/office/drawing/2014/main" id="{EA6AFAE4-9BAC-4599-A7A4-4D528DF0489C}"/>
+              </a:ext>
+            </a:extLst>
+          </p:cNvPr>
+          <p:cNvSpPr>
+            <a:spLocks noGrp="1"/>
+          </p:cNvSpPr>
+          <p:nvPr>
+            <p:ph type="title"/>
+          </p:nvPr>
+        </p:nvSpPr>
+        <p:spPr/>
+        <p:txBody>
+          <a:bodyPr/>
+          <a:lstStyle/>
+          <a:p>
+            <a:endParaRPr lang="es-MX"/>
+          </a:p>
+        </p:txBody>
+      </p:sp>
+      <p:pic>
+        <p:nvPicPr>
+          <p:cNvPr id="4" name="Marcador de contenido 3">
+            <a:extLst>
+              <a:ext uri="{FF2B5EF4-FFF2-40B4-BE49-F238E27FC236}">
+                <a16:creationId xmlns:a16="http://schemas.microsoft.com/office/drawing/2014/main" id="{C4CD4B0E-3286-4598-B036-28DED488279B}"/>
+              </a:ext>
+            </a:extLst>
+          </p:cNvPr>
+          <p:cNvPicPr>
+            <a:picLocks noGrp="1" noChangeAspect="1"/>
+          </p:cNvPicPr>
+          <p:nvPr>
+            <p:ph idx="1"/>
+          </p:nvPr>
+        </p:nvPicPr>
+        <p:blipFill>
+          <a:blip r:embed="rId2"/>
+          <a:stretch>
+            <a:fillRect/>
+          </a:stretch>
+        </p:blipFill>
+        <p:spPr>
+          <a:xfrm>
+            <a:off x="2228144" y="1825625"/>
+            <a:ext cx="7735712" cy="4351338"/>
+          </a:xfrm>
+          <a:prstGeom prst="rect">
+            <a:avLst/>
+          </a:prstGeom>
+        </p:spPr>
+      </p:pic>
+    </p:spTree>
+    <p:extLst>
+      <p:ext uri="{BB962C8B-B14F-4D97-AF65-F5344CB8AC3E}">
+        <p14:creationId xmlns:p14="http://schemas.microsoft.com/office/powerpoint/2010/main" val="2552020815"/>
+      </p:ext>
+    </p:extLst>
+  </p:cSld>
+  <p:clrMapOvr>
+    <a:masterClrMapping/>
+  </p:clrMapOvr>
+</p:sld>
+</file>
+
+<file path=ppt/slides/slide20.xml><?xml version="1.0" encoding="utf-8"?>
+<p:sld xmlns:a="http://schemas.openxmlformats.org/drawingml/2006/main" xmlns:r="http://schemas.openxmlformats.org/officeDocument/2006/relationships" xmlns:p="http://schemas.openxmlformats.org/presentationml/2006/main">
+  <p:cSld>
+    <p:spTree>
+      <p:nvGrpSpPr>
+        <p:cNvPr id="1" name=""/>
+        <p:cNvGrpSpPr/>
+        <p:nvPr/>
+      </p:nvGrpSpPr>
+      <p:grpSpPr>
+        <a:xfrm>
+          <a:off x="0" y="0"/>
+          <a:ext cx="0" cy="0"/>
+          <a:chOff x="0" y="0"/>
+          <a:chExt cx="0" cy="0"/>
+        </a:xfrm>
+      </p:grpSpPr>
+      <p:sp>
+        <p:nvSpPr>
+          <p:cNvPr id="2" name="Título 1">
+            <a:extLst>
+              <a:ext uri="{FF2B5EF4-FFF2-40B4-BE49-F238E27FC236}">
+                <a16:creationId xmlns:a16="http://schemas.microsoft.com/office/drawing/2014/main" id="{F175C2E3-3CFC-4F9F-B084-39720D177CDB}"/>
+              </a:ext>
+            </a:extLst>
+          </p:cNvPr>
+          <p:cNvSpPr>
+            <a:spLocks noGrp="1"/>
+          </p:cNvSpPr>
+          <p:nvPr>
+            <p:ph type="title"/>
+          </p:nvPr>
+        </p:nvSpPr>
+        <p:spPr/>
+        <p:txBody>
+          <a:bodyPr/>
+          <a:lstStyle/>
+          <a:p>
+            <a:endParaRPr lang="es-MX"/>
+          </a:p>
+        </p:txBody>
+      </p:sp>
+      <p:pic>
+        <p:nvPicPr>
+          <p:cNvPr id="4" name="Marcador de contenido 3">
+            <a:extLst>
+              <a:ext uri="{FF2B5EF4-FFF2-40B4-BE49-F238E27FC236}">
+                <a16:creationId xmlns:a16="http://schemas.microsoft.com/office/drawing/2014/main" id="{8638DC24-41A4-4B63-8FA3-26404726FD3E}"/>
+              </a:ext>
+            </a:extLst>
+          </p:cNvPr>
+          <p:cNvPicPr>
+            <a:picLocks noGrp="1" noChangeAspect="1"/>
+          </p:cNvPicPr>
+          <p:nvPr>
+            <p:ph idx="1"/>
+          </p:nvPr>
+        </p:nvPicPr>
+        <p:blipFill>
+          <a:blip r:embed="rId2"/>
+          <a:stretch>
+            <a:fillRect/>
+          </a:stretch>
+        </p:blipFill>
+        <p:spPr>
+          <a:xfrm>
+            <a:off x="2228144" y="1825625"/>
+            <a:ext cx="7735712" cy="4351338"/>
+          </a:xfrm>
+          <a:prstGeom prst="rect">
+            <a:avLst/>
+          </a:prstGeom>
+        </p:spPr>
+      </p:pic>
+    </p:spTree>
+    <p:extLst>
+      <p:ext uri="{BB962C8B-B14F-4D97-AF65-F5344CB8AC3E}">
+        <p14:creationId xmlns:p14="http://schemas.microsoft.com/office/powerpoint/2010/main" val="3458993036"/>
+      </p:ext>
+    </p:extLst>
+  </p:cSld>
+  <p:clrMapOvr>
+    <a:masterClrMapping/>
+  </p:clrMapOvr>
+</p:sld>
+</file>
+
+<file path=ppt/slides/slide21.xml><?xml version="1.0" encoding="utf-8"?>
+<p:sld xmlns:a="http://schemas.openxmlformats.org/drawingml/2006/main" xmlns:r="http://schemas.openxmlformats.org/officeDocument/2006/relationships" xmlns:p="http://schemas.openxmlformats.org/presentationml/2006/main">
+  <p:cSld>
+    <p:spTree>
+      <p:nvGrpSpPr>
+        <p:cNvPr id="1" name=""/>
+        <p:cNvGrpSpPr/>
+        <p:nvPr/>
+      </p:nvGrpSpPr>
+      <p:grpSpPr>
+        <a:xfrm>
+          <a:off x="0" y="0"/>
+          <a:ext cx="0" cy="0"/>
+          <a:chOff x="0" y="0"/>
+          <a:chExt cx="0" cy="0"/>
+        </a:xfrm>
+      </p:grpSpPr>
+      <p:sp>
+        <p:nvSpPr>
+          <p:cNvPr id="2" name="Título 1">
+            <a:extLst>
+              <a:ext uri="{FF2B5EF4-FFF2-40B4-BE49-F238E27FC236}">
+                <a16:creationId xmlns:a16="http://schemas.microsoft.com/office/drawing/2014/main" id="{B461E940-A96F-4C20-AAFC-6DD04C370525}"/>
+              </a:ext>
+            </a:extLst>
+          </p:cNvPr>
+          <p:cNvSpPr>
+            <a:spLocks noGrp="1"/>
+          </p:cNvSpPr>
+          <p:nvPr>
+            <p:ph type="title"/>
+          </p:nvPr>
+        </p:nvSpPr>
+        <p:spPr/>
+        <p:txBody>
+          <a:bodyPr/>
+          <a:lstStyle/>
+          <a:p>
+            <a:endParaRPr lang="es-MX"/>
+          </a:p>
+        </p:txBody>
+      </p:sp>
+      <p:pic>
+        <p:nvPicPr>
+          <p:cNvPr id="4" name="Marcador de contenido 3">
+            <a:extLst>
+              <a:ext uri="{FF2B5EF4-FFF2-40B4-BE49-F238E27FC236}">
+                <a16:creationId xmlns:a16="http://schemas.microsoft.com/office/drawing/2014/main" id="{374A2D2A-E88A-4FAA-B166-34376E85DF0F}"/>
+              </a:ext>
+            </a:extLst>
+          </p:cNvPr>
+          <p:cNvPicPr>
+            <a:picLocks noGrp="1" noChangeAspect="1"/>
+          </p:cNvPicPr>
+          <p:nvPr>
+            <p:ph idx="1"/>
+          </p:nvPr>
+        </p:nvPicPr>
+        <p:blipFill>
+          <a:blip r:embed="rId2"/>
+          <a:stretch>
+            <a:fillRect/>
+          </a:stretch>
+        </p:blipFill>
+        <p:spPr>
+          <a:xfrm>
+            <a:off x="2228144" y="1825625"/>
+            <a:ext cx="7735712" cy="4351338"/>
+          </a:xfrm>
+          <a:prstGeom prst="rect">
+            <a:avLst/>
+          </a:prstGeom>
+        </p:spPr>
+      </p:pic>
+    </p:spTree>
+    <p:extLst>
+      <p:ext uri="{BB962C8B-B14F-4D97-AF65-F5344CB8AC3E}">
+        <p14:creationId xmlns:p14="http://schemas.microsoft.com/office/powerpoint/2010/main" val="2971445309"/>
+      </p:ext>
+    </p:extLst>
+  </p:cSld>
+  <p:clrMapOvr>
+    <a:masterClrMapping/>
+  </p:clrMapOvr>
+</p:sld>
+</file>
+
+<file path=ppt/slides/slide22.xml><?xml version="1.0" encoding="utf-8"?>
+<p:sld xmlns:a="http://schemas.openxmlformats.org/drawingml/2006/main" xmlns:r="http://schemas.openxmlformats.org/officeDocument/2006/relationships" xmlns:p="http://schemas.openxmlformats.org/presentationml/2006/main">
+  <p:cSld>
+    <p:spTree>
+      <p:nvGrpSpPr>
+        <p:cNvPr id="1" name=""/>
+        <p:cNvGrpSpPr/>
+        <p:nvPr/>
+      </p:nvGrpSpPr>
+      <p:grpSpPr>
+        <a:xfrm>
+          <a:off x="0" y="0"/>
+          <a:ext cx="0" cy="0"/>
+          <a:chOff x="0" y="0"/>
+          <a:chExt cx="0" cy="0"/>
+        </a:xfrm>
+      </p:grpSpPr>
+      <p:sp>
+        <p:nvSpPr>
+          <p:cNvPr id="2" name="Título 1">
+            <a:extLst>
+              <a:ext uri="{FF2B5EF4-FFF2-40B4-BE49-F238E27FC236}">
+                <a16:creationId xmlns:a16="http://schemas.microsoft.com/office/drawing/2014/main" id="{51445BD9-E379-4C8A-91E0-B6357AA84866}"/>
+              </a:ext>
+            </a:extLst>
+          </p:cNvPr>
+          <p:cNvSpPr>
+            <a:spLocks noGrp="1"/>
+          </p:cNvSpPr>
+          <p:nvPr>
+            <p:ph type="title"/>
+          </p:nvPr>
+        </p:nvSpPr>
+        <p:spPr/>
+        <p:txBody>
+          <a:bodyPr/>
+          <a:lstStyle/>
+          <a:p>
+            <a:endParaRPr lang="es-MX"/>
+          </a:p>
+        </p:txBody>
+      </p:sp>
+      <p:pic>
+        <p:nvPicPr>
+          <p:cNvPr id="4" name="Marcador de contenido 3">
+            <a:extLst>
+              <a:ext uri="{FF2B5EF4-FFF2-40B4-BE49-F238E27FC236}">
+                <a16:creationId xmlns:a16="http://schemas.microsoft.com/office/drawing/2014/main" id="{28806A68-3E8E-484C-9CBA-C8F6FC32CB79}"/>
+              </a:ext>
+            </a:extLst>
+          </p:cNvPr>
+          <p:cNvPicPr>
+            <a:picLocks noGrp="1" noChangeAspect="1"/>
+          </p:cNvPicPr>
+          <p:nvPr>
+            <p:ph idx="1"/>
+          </p:nvPr>
+        </p:nvPicPr>
+        <p:blipFill>
+          <a:blip r:embed="rId2"/>
+          <a:stretch>
+            <a:fillRect/>
+          </a:stretch>
+        </p:blipFill>
+        <p:spPr>
+          <a:xfrm>
+            <a:off x="2228144" y="1825625"/>
+            <a:ext cx="7735712" cy="4351338"/>
+          </a:xfrm>
+          <a:prstGeom prst="rect">
+            <a:avLst/>
+          </a:prstGeom>
+        </p:spPr>
+      </p:pic>
+    </p:spTree>
+    <p:extLst>
+      <p:ext uri="{BB962C8B-B14F-4D97-AF65-F5344CB8AC3E}">
+        <p14:creationId xmlns:p14="http://schemas.microsoft.com/office/powerpoint/2010/main" val="2324538918"/>
+      </p:ext>
+    </p:extLst>
+  </p:cSld>
+  <p:clrMapOvr>
+    <a:masterClrMapping/>
+  </p:clrMapOvr>
+</p:sld>
+</file>
+
+<file path=ppt/slides/slide23.xml><?xml version="1.0" encoding="utf-8"?>
+<p:sld xmlns:a="http://schemas.openxmlformats.org/drawingml/2006/main" xmlns:r="http://schemas.openxmlformats.org/officeDocument/2006/relationships" xmlns:p="http://schemas.openxmlformats.org/presentationml/2006/main">
+  <p:cSld>
+    <p:spTree>
+      <p:nvGrpSpPr>
+        <p:cNvPr id="1" name=""/>
+        <p:cNvGrpSpPr/>
+        <p:nvPr/>
+      </p:nvGrpSpPr>
+      <p:grpSpPr>
+        <a:xfrm>
+          <a:off x="0" y="0"/>
+          <a:ext cx="0" cy="0"/>
+          <a:chOff x="0" y="0"/>
+          <a:chExt cx="0" cy="0"/>
+        </a:xfrm>
+      </p:grpSpPr>
+      <p:sp>
+        <p:nvSpPr>
+          <p:cNvPr id="2" name="Título 1">
+            <a:extLst>
+              <a:ext uri="{FF2B5EF4-FFF2-40B4-BE49-F238E27FC236}">
+                <a16:creationId xmlns:a16="http://schemas.microsoft.com/office/drawing/2014/main" id="{A4D68406-A6CC-428B-AE58-790F2ED4BB23}"/>
+              </a:ext>
+            </a:extLst>
+          </p:cNvPr>
+          <p:cNvSpPr>
+            <a:spLocks noGrp="1"/>
+          </p:cNvSpPr>
+          <p:nvPr>
+            <p:ph type="title"/>
+          </p:nvPr>
+        </p:nvSpPr>
+        <p:spPr/>
+        <p:txBody>
+          <a:bodyPr/>
+          <a:lstStyle/>
+          <a:p>
+            <a:endParaRPr lang="es-MX"/>
+          </a:p>
+        </p:txBody>
+      </p:sp>
+      <p:sp>
+        <p:nvSpPr>
+          <p:cNvPr id="3" name="Marcador de contenido 2">
+            <a:extLst>
+              <a:ext uri="{FF2B5EF4-FFF2-40B4-BE49-F238E27FC236}">
+                <a16:creationId xmlns:a16="http://schemas.microsoft.com/office/drawing/2014/main" id="{6F25BBD4-8515-41C3-95B2-80CDED4EF2B7}"/>
+              </a:ext>
+            </a:extLst>
+          </p:cNvPr>
+          <p:cNvSpPr>
+            <a:spLocks noGrp="1"/>
+          </p:cNvSpPr>
+          <p:nvPr>
+            <p:ph idx="1"/>
+          </p:nvPr>
+        </p:nvSpPr>
+        <p:spPr/>
+        <p:txBody>
+          <a:bodyPr/>
+          <a:lstStyle/>
+          <a:p>
+            <a:r>
+              <a:rPr lang="es-MX" dirty="0"/>
+              <a:t>Imágenes pantalla Motorola</a:t>
+            </a:r>
+          </a:p>
+        </p:txBody>
+      </p:sp>
+    </p:spTree>
+    <p:extLst>
+      <p:ext uri="{BB962C8B-B14F-4D97-AF65-F5344CB8AC3E}">
+        <p14:creationId xmlns:p14="http://schemas.microsoft.com/office/powerpoint/2010/main" val="398124954"/>
+      </p:ext>
+    </p:extLst>
+  </p:cSld>
+  <p:clrMapOvr>
+    <a:masterClrMapping/>
+  </p:clrMapOvr>
+</p:sld>
+</file>
+
+<file path=ppt/slides/slide24.xml><?xml version="1.0" encoding="utf-8"?>
+<p:sld xmlns:a="http://schemas.openxmlformats.org/drawingml/2006/main" xmlns:r="http://schemas.openxmlformats.org/officeDocument/2006/relationships" xmlns:p="http://schemas.openxmlformats.org/presentationml/2006/main">
+  <p:cSld>
+    <p:spTree>
+      <p:nvGrpSpPr>
+        <p:cNvPr id="1" name=""/>
+        <p:cNvGrpSpPr/>
+        <p:nvPr/>
+      </p:nvGrpSpPr>
+      <p:grpSpPr>
+        <a:xfrm>
+          <a:off x="0" y="0"/>
+          <a:ext cx="0" cy="0"/>
+          <a:chOff x="0" y="0"/>
+          <a:chExt cx="0" cy="0"/>
+        </a:xfrm>
+      </p:grpSpPr>
+      <p:sp>
+        <p:nvSpPr>
+          <p:cNvPr id="2" name="Título 1">
+            <a:extLst>
+              <a:ext uri="{FF2B5EF4-FFF2-40B4-BE49-F238E27FC236}">
+                <a16:creationId xmlns:a16="http://schemas.microsoft.com/office/drawing/2014/main" id="{D4D34717-81BD-4C82-9B0A-535249F69A21}"/>
+              </a:ext>
+            </a:extLst>
+          </p:cNvPr>
+          <p:cNvSpPr>
+            <a:spLocks noGrp="1"/>
+          </p:cNvSpPr>
+          <p:nvPr>
+            <p:ph type="title"/>
+          </p:nvPr>
+        </p:nvSpPr>
+        <p:spPr/>
+        <p:txBody>
+          <a:bodyPr/>
+          <a:lstStyle/>
+          <a:p>
+            <a:endParaRPr lang="es-MX"/>
+          </a:p>
+        </p:txBody>
+      </p:sp>
+      <p:pic>
+        <p:nvPicPr>
+          <p:cNvPr id="4" name="Marcador de contenido 3">
+            <a:extLst>
+              <a:ext uri="{FF2B5EF4-FFF2-40B4-BE49-F238E27FC236}">
+                <a16:creationId xmlns:a16="http://schemas.microsoft.com/office/drawing/2014/main" id="{B0FECAC5-3DF0-4DFE-84BD-74E226B843BF}"/>
+              </a:ext>
+            </a:extLst>
+          </p:cNvPr>
+          <p:cNvPicPr>
+            <a:picLocks noGrp="1" noChangeAspect="1"/>
+          </p:cNvPicPr>
+          <p:nvPr>
+            <p:ph idx="1"/>
+          </p:nvPr>
+        </p:nvPicPr>
+        <p:blipFill>
+          <a:blip r:embed="rId2"/>
+          <a:stretch>
+            <a:fillRect/>
+          </a:stretch>
+        </p:blipFill>
+        <p:spPr>
+          <a:xfrm>
+            <a:off x="2228144" y="1825625"/>
+            <a:ext cx="7735712" cy="4351338"/>
+          </a:xfrm>
+          <a:prstGeom prst="rect">
+            <a:avLst/>
+          </a:prstGeom>
+        </p:spPr>
+      </p:pic>
+    </p:spTree>
+    <p:extLst>
+      <p:ext uri="{BB962C8B-B14F-4D97-AF65-F5344CB8AC3E}">
+        <p14:creationId xmlns:p14="http://schemas.microsoft.com/office/powerpoint/2010/main" val="3022896741"/>
+      </p:ext>
+    </p:extLst>
+  </p:cSld>
+  <p:clrMapOvr>
+    <a:masterClrMapping/>
+  </p:clrMapOvr>
+</p:sld>
+</file>
+
+<file path=ppt/slides/slide25.xml><?xml version="1.0" encoding="utf-8"?>
+<p:sld xmlns:a="http://schemas.openxmlformats.org/drawingml/2006/main" xmlns:r="http://schemas.openxmlformats.org/officeDocument/2006/relationships" xmlns:p="http://schemas.openxmlformats.org/presentationml/2006/main">
+  <p:cSld>
+    <p:spTree>
+      <p:nvGrpSpPr>
+        <p:cNvPr id="1" name=""/>
+        <p:cNvGrpSpPr/>
+        <p:nvPr/>
+      </p:nvGrpSpPr>
+      <p:grpSpPr>
+        <a:xfrm>
+          <a:off x="0" y="0"/>
+          <a:ext cx="0" cy="0"/>
+          <a:chOff x="0" y="0"/>
+          <a:chExt cx="0" cy="0"/>
+        </a:xfrm>
+      </p:grpSpPr>
+      <p:pic>
+        <p:nvPicPr>
+          <p:cNvPr id="4" name="Marcador de contenido 3">
+            <a:extLst>
+              <a:ext uri="{FF2B5EF4-FFF2-40B4-BE49-F238E27FC236}">
+                <a16:creationId xmlns:a16="http://schemas.microsoft.com/office/drawing/2014/main" id="{C553E789-C644-494C-A06B-BFCF291D8E9C}"/>
+              </a:ext>
+            </a:extLst>
+          </p:cNvPr>
+          <p:cNvPicPr>
+            <a:picLocks noGrp="1" noChangeAspect="1"/>
+          </p:cNvPicPr>
+          <p:nvPr>
+            <p:ph idx="1"/>
+          </p:nvPr>
+        </p:nvPicPr>
+        <p:blipFill>
+          <a:blip r:embed="rId2"/>
+          <a:stretch>
+            <a:fillRect/>
+          </a:stretch>
+        </p:blipFill>
+        <p:spPr>
+          <a:xfrm>
+            <a:off x="2228144" y="1825625"/>
+            <a:ext cx="7735712" cy="4351338"/>
+          </a:xfrm>
+          <a:prstGeom prst="rect">
+            <a:avLst/>
+          </a:prstGeom>
+        </p:spPr>
+      </p:pic>
+    </p:spTree>
+    <p:extLst>
+      <p:ext uri="{BB962C8B-B14F-4D97-AF65-F5344CB8AC3E}">
+        <p14:creationId xmlns:p14="http://schemas.microsoft.com/office/powerpoint/2010/main" val="2375280889"/>
+      </p:ext>
+    </p:extLst>
+  </p:cSld>
+  <p:clrMapOvr>
+    <a:masterClrMapping/>
+  </p:clrMapOvr>
+</p:sld>
+</file>
+
+<file path=ppt/slides/slide26.xml><?xml version="1.0" encoding="utf-8"?>
+<p:sld xmlns:a="http://schemas.openxmlformats.org/drawingml/2006/main" xmlns:r="http://schemas.openxmlformats.org/officeDocument/2006/relationships" xmlns:p="http://schemas.openxmlformats.org/presentationml/2006/main">
+  <p:cSld>
+    <p:spTree>
+      <p:nvGrpSpPr>
+        <p:cNvPr id="1" name=""/>
+        <p:cNvGrpSpPr/>
+        <p:nvPr/>
+      </p:nvGrpSpPr>
+      <p:grpSpPr>
+        <a:xfrm>
+          <a:off x="0" y="0"/>
+          <a:ext cx="0" cy="0"/>
+          <a:chOff x="0" y="0"/>
+          <a:chExt cx="0" cy="0"/>
+        </a:xfrm>
+      </p:grpSpPr>
+      <p:sp>
+        <p:nvSpPr>
+          <p:cNvPr id="2" name="Título 1">
+            <a:extLst>
+              <a:ext uri="{FF2B5EF4-FFF2-40B4-BE49-F238E27FC236}">
+                <a16:creationId xmlns:a16="http://schemas.microsoft.com/office/drawing/2014/main" id="{053F0503-9602-43E7-B1A4-8D684E0A0F4A}"/>
+              </a:ext>
+            </a:extLst>
+          </p:cNvPr>
+          <p:cNvSpPr>
+            <a:spLocks noGrp="1"/>
+          </p:cNvSpPr>
+          <p:nvPr>
+            <p:ph type="title"/>
+          </p:nvPr>
+        </p:nvSpPr>
+        <p:spPr/>
+        <p:txBody>
+          <a:bodyPr/>
+          <a:lstStyle/>
+          <a:p>
+            <a:endParaRPr lang="es-MX"/>
+          </a:p>
+        </p:txBody>
+      </p:sp>
+      <p:sp>
+        <p:nvSpPr>
+          <p:cNvPr id="6" name="Marcador de contenido 5">
+            <a:extLst>
+              <a:ext uri="{FF2B5EF4-FFF2-40B4-BE49-F238E27FC236}">
+                <a16:creationId xmlns:a16="http://schemas.microsoft.com/office/drawing/2014/main" id="{3892AAD6-DCE3-4A20-8770-FB9CD034A88F}"/>
+              </a:ext>
+            </a:extLst>
+          </p:cNvPr>
+          <p:cNvSpPr>
+            <a:spLocks noGrp="1"/>
+          </p:cNvSpPr>
+          <p:nvPr>
+            <p:ph idx="1"/>
+          </p:nvPr>
+        </p:nvSpPr>
+        <p:spPr/>
+        <p:txBody>
+          <a:bodyPr/>
+          <a:lstStyle/>
+          <a:p>
+            <a:endParaRPr lang="es-MX"/>
+          </a:p>
+        </p:txBody>
+      </p:sp>
+    </p:spTree>
+    <p:extLst>
+      <p:ext uri="{BB962C8B-B14F-4D97-AF65-F5344CB8AC3E}">
+        <p14:creationId xmlns:p14="http://schemas.microsoft.com/office/powerpoint/2010/main" val="3562523270"/>
+      </p:ext>
+    </p:extLst>
+  </p:cSld>
+  <p:clrMapOvr>
+    <a:masterClrMapping/>
+  </p:clrMapOvr>
+</p:sld>
+</file>
+
+<file path=ppt/slides/slide3.xml><?xml version="1.0" encoding="utf-8"?>
+<p:sld xmlns:a="http://schemas.openxmlformats.org/drawingml/2006/main" xmlns:r="http://schemas.openxmlformats.org/officeDocument/2006/relationships" xmlns:p="http://schemas.openxmlformats.org/presentationml/2006/main">
+  <p:cSld>
+    <p:spTree>
+      <p:nvGrpSpPr>
+        <p:cNvPr id="1" name=""/>
+        <p:cNvGrpSpPr/>
+        <p:nvPr/>
+      </p:nvGrpSpPr>
+      <p:grpSpPr>
+        <a:xfrm>
+          <a:off x="0" y="0"/>
+          <a:ext cx="0" cy="0"/>
+          <a:chOff x="0" y="0"/>
+          <a:chExt cx="0" cy="0"/>
+        </a:xfrm>
+      </p:grpSpPr>
+      <p:sp>
+        <p:nvSpPr>
+          <p:cNvPr id="2" name="Título 1">
+            <a:extLst>
+              <a:ext uri="{FF2B5EF4-FFF2-40B4-BE49-F238E27FC236}">
+                <a16:creationId xmlns:a16="http://schemas.microsoft.com/office/drawing/2014/main" id="{DD01EE5E-CB06-4D0E-91EB-6DEBD50DF313}"/>
+              </a:ext>
+            </a:extLst>
+          </p:cNvPr>
+          <p:cNvSpPr>
+            <a:spLocks noGrp="1"/>
+          </p:cNvSpPr>
+          <p:nvPr>
+            <p:ph type="title"/>
+          </p:nvPr>
+        </p:nvSpPr>
+        <p:spPr/>
+        <p:txBody>
+          <a:bodyPr/>
+          <a:lstStyle/>
+          <a:p>
+            <a:endParaRPr lang="es-MX"/>
+          </a:p>
+        </p:txBody>
+      </p:sp>
+      <p:pic>
+        <p:nvPicPr>
+          <p:cNvPr id="4" name="Marcador de contenido 3">
+            <a:extLst>
+              <a:ext uri="{FF2B5EF4-FFF2-40B4-BE49-F238E27FC236}">
+                <a16:creationId xmlns:a16="http://schemas.microsoft.com/office/drawing/2014/main" id="{72A81A82-E5C7-4E92-9729-C6007989A1F3}"/>
+              </a:ext>
+            </a:extLst>
+          </p:cNvPr>
+          <p:cNvPicPr>
+            <a:picLocks noGrp="1" noChangeAspect="1"/>
+          </p:cNvPicPr>
+          <p:nvPr>
+            <p:ph idx="1"/>
+          </p:nvPr>
+        </p:nvPicPr>
+        <p:blipFill>
+          <a:blip r:embed="rId2"/>
+          <a:stretch>
+            <a:fillRect/>
+          </a:stretch>
+        </p:blipFill>
+        <p:spPr>
+          <a:xfrm>
+            <a:off x="2228144" y="1825625"/>
+            <a:ext cx="7735712" cy="4351338"/>
+          </a:xfrm>
+          <a:prstGeom prst="rect">
+            <a:avLst/>
+          </a:prstGeom>
+        </p:spPr>
+      </p:pic>
+    </p:spTree>
+    <p:extLst>
+      <p:ext uri="{BB962C8B-B14F-4D97-AF65-F5344CB8AC3E}">
+        <p14:creationId xmlns:p14="http://schemas.microsoft.com/office/powerpoint/2010/main" val="1206245293"/>
+      </p:ext>
+    </p:extLst>
+  </p:cSld>
+  <p:clrMapOvr>
+    <a:masterClrMapping/>
+  </p:clrMapOvr>
+</p:sld>
+</file>
+
+<file path=ppt/slides/slide4.xml><?xml version="1.0" encoding="utf-8"?>
+<p:sld xmlns:a="http://schemas.openxmlformats.org/drawingml/2006/main" xmlns:r="http://schemas.openxmlformats.org/officeDocument/2006/relationships" xmlns:p="http://schemas.openxmlformats.org/presentationml/2006/main">
+  <p:cSld>
+    <p:spTree>
+      <p:nvGrpSpPr>
+        <p:cNvPr id="1" name=""/>
+        <p:cNvGrpSpPr/>
+        <p:nvPr/>
+      </p:nvGrpSpPr>
+      <p:grpSpPr>
+        <a:xfrm>
+          <a:off x="0" y="0"/>
+          <a:ext cx="0" cy="0"/>
+          <a:chOff x="0" y="0"/>
+          <a:chExt cx="0" cy="0"/>
+        </a:xfrm>
+      </p:grpSpPr>
+      <p:sp>
+        <p:nvSpPr>
+          <p:cNvPr id="2" name="Título 1">
+            <a:extLst>
+              <a:ext uri="{FF2B5EF4-FFF2-40B4-BE49-F238E27FC236}">
+                <a16:creationId xmlns:a16="http://schemas.microsoft.com/office/drawing/2014/main" id="{21949306-13AC-43EC-BB1C-3A25DCB12E03}"/>
+              </a:ext>
+            </a:extLst>
+          </p:cNvPr>
+          <p:cNvSpPr>
+            <a:spLocks noGrp="1"/>
+          </p:cNvSpPr>
+          <p:nvPr>
+            <p:ph type="title"/>
+          </p:nvPr>
+        </p:nvSpPr>
+        <p:spPr/>
+        <p:txBody>
+          <a:bodyPr/>
+          <a:lstStyle/>
+          <a:p>
+            <a:endParaRPr lang="es-MX"/>
+          </a:p>
+        </p:txBody>
+      </p:sp>
+      <p:pic>
+        <p:nvPicPr>
+          <p:cNvPr id="4" name="Marcador de contenido 3">
+            <a:extLst>
+              <a:ext uri="{FF2B5EF4-FFF2-40B4-BE49-F238E27FC236}">
+                <a16:creationId xmlns:a16="http://schemas.microsoft.com/office/drawing/2014/main" id="{59586701-8349-48A6-90BF-612412F54394}"/>
+              </a:ext>
+            </a:extLst>
+          </p:cNvPr>
+          <p:cNvPicPr>
+            <a:picLocks noGrp="1" noChangeAspect="1"/>
+          </p:cNvPicPr>
+          <p:nvPr>
+            <p:ph idx="1"/>
+          </p:nvPr>
+        </p:nvPicPr>
+        <p:blipFill>
+          <a:blip r:embed="rId2"/>
+          <a:stretch>
+            <a:fillRect/>
+          </a:stretch>
+        </p:blipFill>
+        <p:spPr>
+          <a:xfrm>
+            <a:off x="2228144" y="1825625"/>
+            <a:ext cx="7735712" cy="4351338"/>
+          </a:xfrm>
+          <a:prstGeom prst="rect">
+            <a:avLst/>
+          </a:prstGeom>
+        </p:spPr>
+      </p:pic>
+    </p:spTree>
+    <p:extLst>
+      <p:ext uri="{BB962C8B-B14F-4D97-AF65-F5344CB8AC3E}">
+        <p14:creationId xmlns:p14="http://schemas.microsoft.com/office/powerpoint/2010/main" val="285220043"/>
+      </p:ext>
+    </p:extLst>
+  </p:cSld>
+  <p:clrMapOvr>
+    <a:masterClrMapping/>
+  </p:clrMapOvr>
+</p:sld>
+</file>
+
+<file path=ppt/slides/slide5.xml><?xml version="1.0" encoding="utf-8"?>
+<p:sld xmlns:a="http://schemas.openxmlformats.org/drawingml/2006/main" xmlns:r="http://schemas.openxmlformats.org/officeDocument/2006/relationships" xmlns:p="http://schemas.openxmlformats.org/presentationml/2006/main">
+  <p:cSld>
+    <p:spTree>
+      <p:nvGrpSpPr>
+        <p:cNvPr id="1" name=""/>
+        <p:cNvGrpSpPr/>
+        <p:nvPr/>
+      </p:nvGrpSpPr>
+      <p:grpSpPr>
+        <a:xfrm>
+          <a:off x="0" y="0"/>
+          <a:ext cx="0" cy="0"/>
+          <a:chOff x="0" y="0"/>
+          <a:chExt cx="0" cy="0"/>
+        </a:xfrm>
+      </p:grpSpPr>
+      <p:sp>
+        <p:nvSpPr>
+          <p:cNvPr id="2" name="Título 1">
+            <a:extLst>
+              <a:ext uri="{FF2B5EF4-FFF2-40B4-BE49-F238E27FC236}">
+                <a16:creationId xmlns:a16="http://schemas.microsoft.com/office/drawing/2014/main" id="{84CF56D0-B773-4799-AD7E-436E7AC327D6}"/>
+              </a:ext>
+            </a:extLst>
+          </p:cNvPr>
+          <p:cNvSpPr>
+            <a:spLocks noGrp="1"/>
+          </p:cNvSpPr>
+          <p:nvPr>
+            <p:ph type="title"/>
+          </p:nvPr>
+        </p:nvSpPr>
+        <p:spPr/>
+        <p:txBody>
+          <a:bodyPr/>
+          <a:lstStyle/>
+          <a:p>
+            <a:endParaRPr lang="es-MX"/>
+          </a:p>
+        </p:txBody>
+      </p:sp>
+      <p:sp>
+        <p:nvSpPr>
+          <p:cNvPr id="3" name="Marcador de contenido 2">
+            <a:extLst>
+              <a:ext uri="{FF2B5EF4-FFF2-40B4-BE49-F238E27FC236}">
+                <a16:creationId xmlns:a16="http://schemas.microsoft.com/office/drawing/2014/main" id="{EBD5D375-521D-43CF-ACD5-4BC78340CB8E}"/>
+              </a:ext>
+            </a:extLst>
+          </p:cNvPr>
+          <p:cNvSpPr>
+            <a:spLocks noGrp="1"/>
+          </p:cNvSpPr>
+          <p:nvPr>
+            <p:ph idx="1"/>
+          </p:nvPr>
+        </p:nvSpPr>
+        <p:spPr/>
+        <p:txBody>
+          <a:bodyPr/>
+          <a:lstStyle/>
+          <a:p>
+            <a:endParaRPr lang="es-MX"/>
+          </a:p>
+        </p:txBody>
+      </p:sp>
+      <p:pic>
+        <p:nvPicPr>
+          <p:cNvPr id="4" name="Imagen 3">
+            <a:extLst>
+              <a:ext uri="{FF2B5EF4-FFF2-40B4-BE49-F238E27FC236}">
+                <a16:creationId xmlns:a16="http://schemas.microsoft.com/office/drawing/2014/main" id="{906E4C28-5479-45F1-80FB-A80FF583E9BE}"/>
+              </a:ext>
+            </a:extLst>
+          </p:cNvPr>
+          <p:cNvPicPr>
+            <a:picLocks noChangeAspect="1"/>
+          </p:cNvPicPr>
+          <p:nvPr/>
+        </p:nvPicPr>
+        <p:blipFill>
+          <a:blip r:embed="rId2"/>
+          <a:stretch>
+            <a:fillRect/>
+          </a:stretch>
+        </p:blipFill>
+        <p:spPr>
+          <a:xfrm>
+            <a:off x="0" y="0"/>
+            <a:ext cx="12192000" cy="6858000"/>
+          </a:xfrm>
+          <a:prstGeom prst="rect">
+            <a:avLst/>
+          </a:prstGeom>
+        </p:spPr>
+      </p:pic>
+    </p:spTree>
+    <p:extLst>
+      <p:ext uri="{BB962C8B-B14F-4D97-AF65-F5344CB8AC3E}">
+        <p14:creationId xmlns:p14="http://schemas.microsoft.com/office/powerpoint/2010/main" val="3408964327"/>
+      </p:ext>
+    </p:extLst>
+  </p:cSld>
+  <p:clrMapOvr>
+    <a:masterClrMapping/>
+  </p:clrMapOvr>
+</p:sld>
+</file>
+
+<file path=ppt/slides/slide6.xml><?xml version="1.0" encoding="utf-8"?>
+<p:sld xmlns:a="http://schemas.openxmlformats.org/drawingml/2006/main" xmlns:r="http://schemas.openxmlformats.org/officeDocument/2006/relationships" xmlns:p="http://schemas.openxmlformats.org/presentationml/2006/main">
+  <p:cSld>
+    <p:spTree>
+      <p:nvGrpSpPr>
+        <p:cNvPr id="1" name=""/>
+        <p:cNvGrpSpPr/>
+        <p:nvPr/>
+      </p:nvGrpSpPr>
+      <p:grpSpPr>
+        <a:xfrm>
+          <a:off x="0" y="0"/>
+          <a:ext cx="0" cy="0"/>
+          <a:chOff x="0" y="0"/>
+          <a:chExt cx="0" cy="0"/>
+        </a:xfrm>
+      </p:grpSpPr>
+      <p:sp>
+        <p:nvSpPr>
+          <p:cNvPr id="2" name="Título 1">
+            <a:extLst>
+              <a:ext uri="{FF2B5EF4-FFF2-40B4-BE49-F238E27FC236}">
+                <a16:creationId xmlns:a16="http://schemas.microsoft.com/office/drawing/2014/main" id="{9E251812-C76B-42EA-9C4D-5DAE42AA670C}"/>
+              </a:ext>
+            </a:extLst>
+          </p:cNvPr>
+          <p:cNvSpPr>
+            <a:spLocks noGrp="1"/>
+          </p:cNvSpPr>
+          <p:nvPr>
+            <p:ph type="title"/>
+          </p:nvPr>
+        </p:nvSpPr>
+        <p:spPr/>
+        <p:txBody>
+          <a:bodyPr/>
+          <a:lstStyle/>
+          <a:p>
+            <a:endParaRPr lang="es-MX"/>
+          </a:p>
+        </p:txBody>
+      </p:sp>
+      <p:pic>
+        <p:nvPicPr>
+          <p:cNvPr id="5" name="Marcador de contenido 4">
+            <a:extLst>
+              <a:ext uri="{FF2B5EF4-FFF2-40B4-BE49-F238E27FC236}">
+                <a16:creationId xmlns:a16="http://schemas.microsoft.com/office/drawing/2014/main" id="{CBA7B97B-EBF3-4E13-8ED3-AF6871C71850}"/>
+              </a:ext>
+            </a:extLst>
+          </p:cNvPr>
+          <p:cNvPicPr>
+            <a:picLocks noGrp="1" noChangeAspect="1"/>
+          </p:cNvPicPr>
+          <p:nvPr>
+            <p:ph idx="1"/>
+          </p:nvPr>
+        </p:nvPicPr>
+        <p:blipFill>
+          <a:blip r:embed="rId2"/>
+          <a:stretch>
+            <a:fillRect/>
+          </a:stretch>
+        </p:blipFill>
+        <p:spPr>
+          <a:xfrm>
+            <a:off x="2228144" y="1825625"/>
+            <a:ext cx="7735712" cy="4351338"/>
+          </a:xfrm>
+          <a:prstGeom prst="rect">
+            <a:avLst/>
+          </a:prstGeom>
+        </p:spPr>
+      </p:pic>
+    </p:spTree>
+    <p:extLst>
+      <p:ext uri="{BB962C8B-B14F-4D97-AF65-F5344CB8AC3E}">
+        <p14:creationId xmlns:p14="http://schemas.microsoft.com/office/powerpoint/2010/main" val="3671641844"/>
+      </p:ext>
+    </p:extLst>
+  </p:cSld>
+  <p:clrMapOvr>
+    <a:masterClrMapping/>
+  </p:clrMapOvr>
+</p:sld>
+</file>
+
+<file path=ppt/slides/slide7.xml><?xml version="1.0" encoding="utf-8"?>
+<p:sld xmlns:a="http://schemas.openxmlformats.org/drawingml/2006/main" xmlns:r="http://schemas.openxmlformats.org/officeDocument/2006/relationships" xmlns:p="http://schemas.openxmlformats.org/presentationml/2006/main">
+  <p:cSld>
+    <p:spTree>
+      <p:nvGrpSpPr>
+        <p:cNvPr id="1" name=""/>
+        <p:cNvGrpSpPr/>
+        <p:nvPr/>
+      </p:nvGrpSpPr>
+      <p:grpSpPr>
+        <a:xfrm>
+          <a:off x="0" y="0"/>
+          <a:ext cx="0" cy="0"/>
+          <a:chOff x="0" y="0"/>
+          <a:chExt cx="0" cy="0"/>
+        </a:xfrm>
+      </p:grpSpPr>
+      <p:sp>
+        <p:nvSpPr>
+          <p:cNvPr id="2" name="Título 1">
+            <a:extLst>
+              <a:ext uri="{FF2B5EF4-FFF2-40B4-BE49-F238E27FC236}">
+                <a16:creationId xmlns:a16="http://schemas.microsoft.com/office/drawing/2014/main" id="{B5BEC337-ED2A-4BB7-9ABC-2BB9C3C94A5B}"/>
+              </a:ext>
+            </a:extLst>
+          </p:cNvPr>
+          <p:cNvSpPr>
+            <a:spLocks noGrp="1"/>
+          </p:cNvSpPr>
+          <p:nvPr>
+            <p:ph type="title"/>
+          </p:nvPr>
+        </p:nvSpPr>
+        <p:spPr/>
+        <p:txBody>
+          <a:bodyPr/>
+          <a:lstStyle/>
+          <a:p>
+            <a:endParaRPr lang="es-MX"/>
+          </a:p>
+        </p:txBody>
+      </p:sp>
+      <p:pic>
+        <p:nvPicPr>
+          <p:cNvPr id="4" name="Marcador de contenido 3">
+            <a:extLst>
+              <a:ext uri="{FF2B5EF4-FFF2-40B4-BE49-F238E27FC236}">
+                <a16:creationId xmlns:a16="http://schemas.microsoft.com/office/drawing/2014/main" id="{05DAB4A5-808F-440D-8D69-38CB6E187D7A}"/>
+              </a:ext>
+            </a:extLst>
+          </p:cNvPr>
+          <p:cNvPicPr>
+            <a:picLocks noGrp="1" noChangeAspect="1"/>
+          </p:cNvPicPr>
+          <p:nvPr>
+            <p:ph idx="1"/>
+          </p:nvPr>
+        </p:nvPicPr>
+        <p:blipFill>
+          <a:blip r:embed="rId2"/>
+          <a:stretch>
+            <a:fillRect/>
+          </a:stretch>
+        </p:blipFill>
+        <p:spPr>
+          <a:xfrm>
+            <a:off x="2228144" y="1825625"/>
+            <a:ext cx="7735712" cy="4351338"/>
+          </a:xfrm>
+          <a:prstGeom prst="rect">
+            <a:avLst/>
+          </a:prstGeom>
+        </p:spPr>
+      </p:pic>
+    </p:spTree>
+    <p:extLst>
+      <p:ext uri="{BB962C8B-B14F-4D97-AF65-F5344CB8AC3E}">
+        <p14:creationId xmlns:p14="http://schemas.microsoft.com/office/powerpoint/2010/main" val="2438128620"/>
+      </p:ext>
+    </p:extLst>
+  </p:cSld>
+  <p:clrMapOvr>
+    <a:masterClrMapping/>
+  </p:clrMapOvr>
+</p:sld>
+</file>
+
+<file path=ppt/slides/slide8.xml><?xml version="1.0" encoding="utf-8"?>
+<p:sld xmlns:a="http://schemas.openxmlformats.org/drawingml/2006/main" xmlns:r="http://schemas.openxmlformats.org/officeDocument/2006/relationships" xmlns:p="http://schemas.openxmlformats.org/presentationml/2006/main">
+  <p:cSld>
+    <p:spTree>
+      <p:nvGrpSpPr>
+        <p:cNvPr id="1" name=""/>
+        <p:cNvGrpSpPr/>
+        <p:nvPr/>
+      </p:nvGrpSpPr>
+      <p:grpSpPr>
+        <a:xfrm>
+          <a:off x="0" y="0"/>
+          <a:ext cx="0" cy="0"/>
+          <a:chOff x="0" y="0"/>
+          <a:chExt cx="0" cy="0"/>
+        </a:xfrm>
+      </p:grpSpPr>
+      <p:sp>
+        <p:nvSpPr>
+          <p:cNvPr id="2" name="Título 1">
+            <a:extLst>
+              <a:ext uri="{FF2B5EF4-FFF2-40B4-BE49-F238E27FC236}">
+                <a16:creationId xmlns:a16="http://schemas.microsoft.com/office/drawing/2014/main" id="{EBC968D4-DC5D-48A2-A714-E3B71E6EE922}"/>
+              </a:ext>
+            </a:extLst>
+          </p:cNvPr>
+          <p:cNvSpPr>
+            <a:spLocks noGrp="1"/>
+          </p:cNvSpPr>
+          <p:nvPr>
+            <p:ph type="title"/>
+          </p:nvPr>
+        </p:nvSpPr>
+        <p:spPr/>
+        <p:txBody>
+          <a:bodyPr/>
+          <a:lstStyle/>
+          <a:p>
+            <a:endParaRPr lang="es-MX"/>
+          </a:p>
+        </p:txBody>
+      </p:sp>
+      <p:pic>
+        <p:nvPicPr>
+          <p:cNvPr id="4" name="Marcador de contenido 3">
+            <a:extLst>
+              <a:ext uri="{FF2B5EF4-FFF2-40B4-BE49-F238E27FC236}">
+                <a16:creationId xmlns:a16="http://schemas.microsoft.com/office/drawing/2014/main" id="{AD96A215-2A1E-463E-851C-04377A91FDE0}"/>
+              </a:ext>
+            </a:extLst>
+          </p:cNvPr>
+          <p:cNvPicPr>
+            <a:picLocks noGrp="1" noChangeAspect="1"/>
+          </p:cNvPicPr>
+          <p:nvPr>
+            <p:ph idx="1"/>
+          </p:nvPr>
+        </p:nvPicPr>
+        <p:blipFill>
+          <a:blip r:embed="rId2"/>
+          <a:stretch>
+            <a:fillRect/>
+          </a:stretch>
+        </p:blipFill>
+        <p:spPr>
+          <a:xfrm>
+            <a:off x="2228144" y="1825625"/>
+            <a:ext cx="7735712" cy="4351338"/>
+          </a:xfrm>
+          <a:prstGeom prst="rect">
+            <a:avLst/>
+          </a:prstGeom>
+        </p:spPr>
+      </p:pic>
+    </p:spTree>
+    <p:extLst>
+      <p:ext uri="{BB962C8B-B14F-4D97-AF65-F5344CB8AC3E}">
+        <p14:creationId xmlns:p14="http://schemas.microsoft.com/office/powerpoint/2010/main" val="1820213616"/>
+      </p:ext>
+    </p:extLst>
+  </p:cSld>
+  <p:clrMapOvr>
+    <a:masterClrMapping/>
+  </p:clrMapOvr>
+</p:sld>
+</file>
+
+<file path=ppt/slides/slide9.xml><?xml version="1.0" encoding="utf-8"?>
+<p:sld xmlns:a="http://schemas.openxmlformats.org/drawingml/2006/main" xmlns:r="http://schemas.openxmlformats.org/officeDocument/2006/relationships" xmlns:p="http://schemas.openxmlformats.org/presentationml/2006/main">
+  <p:cSld>
+    <p:spTree>
+      <p:nvGrpSpPr>
+        <p:cNvPr id="1" name=""/>
+        <p:cNvGrpSpPr/>
+        <p:nvPr/>
+      </p:nvGrpSpPr>
+      <p:grpSpPr>
+        <a:xfrm>
+          <a:off x="0" y="0"/>
+          <a:ext cx="0" cy="0"/>
+          <a:chOff x="0" y="0"/>
+          <a:chExt cx="0" cy="0"/>
+        </a:xfrm>
+      </p:grpSpPr>
+      <p:sp>
+        <p:nvSpPr>
+          <p:cNvPr id="2" name="Título 1">
+            <a:extLst>
+              <a:ext uri="{FF2B5EF4-FFF2-40B4-BE49-F238E27FC236}">
+                <a16:creationId xmlns:a16="http://schemas.microsoft.com/office/drawing/2014/main" id="{C7302B35-CEEC-4A27-82B1-5A7C9B310F19}"/>
+              </a:ext>
+            </a:extLst>
+          </p:cNvPr>
+          <p:cNvSpPr>
+            <a:spLocks noGrp="1"/>
+          </p:cNvSpPr>
+          <p:nvPr>
+            <p:ph type="title"/>
+          </p:nvPr>
+        </p:nvSpPr>
+        <p:spPr/>
+        <p:txBody>
+          <a:bodyPr/>
+          <a:lstStyle/>
+          <a:p>
+            <a:endParaRPr lang="es-MX"/>
+          </a:p>
+        </p:txBody>
+      </p:sp>
+      <p:pic>
+        <p:nvPicPr>
+          <p:cNvPr id="4" name="Marcador de contenido 3">
+            <a:extLst>
+              <a:ext uri="{FF2B5EF4-FFF2-40B4-BE49-F238E27FC236}">
+                <a16:creationId xmlns:a16="http://schemas.microsoft.com/office/drawing/2014/main" id="{2158C10A-011E-4814-861A-1530324063F9}"/>
+              </a:ext>
+            </a:extLst>
+          </p:cNvPr>
+          <p:cNvPicPr>
+            <a:picLocks noGrp="1" noChangeAspect="1"/>
+          </p:cNvPicPr>
+          <p:nvPr>
+            <p:ph idx="1"/>
+          </p:nvPr>
+        </p:nvPicPr>
+        <p:blipFill>
+          <a:blip r:embed="rId2"/>
+          <a:stretch>
+            <a:fillRect/>
+          </a:stretch>
+        </p:blipFill>
+        <p:spPr>
+          <a:xfrm>
+            <a:off x="2228144" y="1825625"/>
+            <a:ext cx="7735712" cy="4351338"/>
+          </a:xfrm>
+          <a:prstGeom prst="rect">
+            <a:avLst/>
+          </a:prstGeom>
+        </p:spPr>
+      </p:pic>
+    </p:spTree>
+    <p:extLst>
+      <p:ext uri="{BB962C8B-B14F-4D97-AF65-F5344CB8AC3E}">
+        <p14:creationId xmlns:p14="http://schemas.microsoft.com/office/powerpoint/2010/main" val="1746695065"/>
+      </p:ext>
+    </p:extLst>
+  </p:cSld>
+  <p:clrMapOvr>
+    <a:masterClrMapping/>
+  </p:clrMapOvr>
+</p:sld>
+</file>
+
 <file path=ppt/theme/theme1.xml><?xml version="1.0" encoding="utf-8"?>
 <a:theme xmlns:a="http://schemas.openxmlformats.org/drawingml/2006/main" name="Tema de Office">
   <a:themeElements>

</xml_diff>

<commit_message>
SELECT * FROM T_Registro TO LIST ---------------------- Se seleccionan los registros y se ponen en un ListView
</commit_message>
<xml_diff>
--- a/SQLite.pptx
+++ b/SQLite.pptx
@@ -31,6 +31,9 @@
     <p:sldId id="279" r:id="rId25"/>
     <p:sldId id="280" r:id="rId26"/>
     <p:sldId id="276" r:id="rId27"/>
+    <p:sldId id="282" r:id="rId28"/>
+    <p:sldId id="283" r:id="rId29"/>
+    <p:sldId id="284" r:id="rId30"/>
   </p:sldIdLst>
   <p:sldSz cx="12192000" cy="6858000"/>
   <p:notesSz cx="6858000" cy="9144000"/>
@@ -4921,35 +4924,289 @@
           </a:p>
         </p:txBody>
       </p:sp>
-      <p:sp>
-        <p:nvSpPr>
-          <p:cNvPr id="6" name="Marcador de contenido 5">
-            <a:extLst>
-              <a:ext uri="{FF2B5EF4-FFF2-40B4-BE49-F238E27FC236}">
-                <a16:creationId xmlns:a16="http://schemas.microsoft.com/office/drawing/2014/main" id="{3892AAD6-DCE3-4A20-8770-FB9CD034A88F}"/>
-              </a:ext>
-            </a:extLst>
-          </p:cNvPr>
-          <p:cNvSpPr>
-            <a:spLocks noGrp="1"/>
-          </p:cNvSpPr>
+      <p:pic>
+        <p:nvPicPr>
+          <p:cNvPr id="11" name="Marcador de contenido 10">
+            <a:extLst>
+              <a:ext uri="{FF2B5EF4-FFF2-40B4-BE49-F238E27FC236}">
+                <a16:creationId xmlns:a16="http://schemas.microsoft.com/office/drawing/2014/main" id="{95154920-6A11-4545-8D32-EA6A6653C2EF}"/>
+              </a:ext>
+            </a:extLst>
+          </p:cNvPr>
+          <p:cNvPicPr>
+            <a:picLocks noGrp="1" noChangeAspect="1"/>
+          </p:cNvPicPr>
           <p:nvPr>
             <p:ph idx="1"/>
           </p:nvPr>
-        </p:nvSpPr>
-        <p:spPr/>
-        <p:txBody>
-          <a:bodyPr/>
-          <a:lstStyle/>
-          <a:p>
-            <a:endParaRPr lang="es-MX"/>
-          </a:p>
-        </p:txBody>
-      </p:sp>
+        </p:nvPicPr>
+        <p:blipFill>
+          <a:blip r:embed="rId2"/>
+          <a:stretch>
+            <a:fillRect/>
+          </a:stretch>
+        </p:blipFill>
+        <p:spPr>
+          <a:xfrm>
+            <a:off x="2228144" y="1825625"/>
+            <a:ext cx="7735712" cy="4351338"/>
+          </a:xfrm>
+          <a:prstGeom prst="rect">
+            <a:avLst/>
+          </a:prstGeom>
+        </p:spPr>
+      </p:pic>
     </p:spTree>
     <p:extLst>
       <p:ext uri="{BB962C8B-B14F-4D97-AF65-F5344CB8AC3E}">
         <p14:creationId xmlns:p14="http://schemas.microsoft.com/office/powerpoint/2010/main" val="3562523270"/>
+      </p:ext>
+    </p:extLst>
+  </p:cSld>
+  <p:clrMapOvr>
+    <a:masterClrMapping/>
+  </p:clrMapOvr>
+</p:sld>
+</file>
+
+<file path=ppt/slides/slide27.xml><?xml version="1.0" encoding="utf-8"?>
+<p:sld xmlns:a="http://schemas.openxmlformats.org/drawingml/2006/main" xmlns:r="http://schemas.openxmlformats.org/officeDocument/2006/relationships" xmlns:p="http://schemas.openxmlformats.org/presentationml/2006/main">
+  <p:cSld>
+    <p:spTree>
+      <p:nvGrpSpPr>
+        <p:cNvPr id="1" name=""/>
+        <p:cNvGrpSpPr/>
+        <p:nvPr/>
+      </p:nvGrpSpPr>
+      <p:grpSpPr>
+        <a:xfrm>
+          <a:off x="0" y="0"/>
+          <a:ext cx="0" cy="0"/>
+          <a:chOff x="0" y="0"/>
+          <a:chExt cx="0" cy="0"/>
+        </a:xfrm>
+      </p:grpSpPr>
+      <p:sp>
+        <p:nvSpPr>
+          <p:cNvPr id="2" name="Título 1">
+            <a:extLst>
+              <a:ext uri="{FF2B5EF4-FFF2-40B4-BE49-F238E27FC236}">
+                <a16:creationId xmlns:a16="http://schemas.microsoft.com/office/drawing/2014/main" id="{3EC2FA2D-EEF5-48A2-BC92-36722592CF44}"/>
+              </a:ext>
+            </a:extLst>
+          </p:cNvPr>
+          <p:cNvSpPr>
+            <a:spLocks noGrp="1"/>
+          </p:cNvSpPr>
+          <p:nvPr>
+            <p:ph type="title"/>
+          </p:nvPr>
+        </p:nvSpPr>
+        <p:spPr/>
+        <p:txBody>
+          <a:bodyPr/>
+          <a:lstStyle/>
+          <a:p>
+            <a:endParaRPr lang="es-MX"/>
+          </a:p>
+        </p:txBody>
+      </p:sp>
+      <p:pic>
+        <p:nvPicPr>
+          <p:cNvPr id="4" name="Marcador de contenido 3">
+            <a:extLst>
+              <a:ext uri="{FF2B5EF4-FFF2-40B4-BE49-F238E27FC236}">
+                <a16:creationId xmlns:a16="http://schemas.microsoft.com/office/drawing/2014/main" id="{49A50EC2-66C2-4F67-9707-88AD63A8D297}"/>
+              </a:ext>
+            </a:extLst>
+          </p:cNvPr>
+          <p:cNvPicPr>
+            <a:picLocks noGrp="1" noChangeAspect="1"/>
+          </p:cNvPicPr>
+          <p:nvPr>
+            <p:ph idx="1"/>
+          </p:nvPr>
+        </p:nvPicPr>
+        <p:blipFill>
+          <a:blip r:embed="rId2"/>
+          <a:stretch>
+            <a:fillRect/>
+          </a:stretch>
+        </p:blipFill>
+        <p:spPr>
+          <a:xfrm>
+            <a:off x="2228144" y="1825625"/>
+            <a:ext cx="7735712" cy="4351338"/>
+          </a:xfrm>
+          <a:prstGeom prst="rect">
+            <a:avLst/>
+          </a:prstGeom>
+        </p:spPr>
+      </p:pic>
+    </p:spTree>
+    <p:extLst>
+      <p:ext uri="{BB962C8B-B14F-4D97-AF65-F5344CB8AC3E}">
+        <p14:creationId xmlns:p14="http://schemas.microsoft.com/office/powerpoint/2010/main" val="1592441660"/>
+      </p:ext>
+    </p:extLst>
+  </p:cSld>
+  <p:clrMapOvr>
+    <a:masterClrMapping/>
+  </p:clrMapOvr>
+</p:sld>
+</file>
+
+<file path=ppt/slides/slide28.xml><?xml version="1.0" encoding="utf-8"?>
+<p:sld xmlns:a="http://schemas.openxmlformats.org/drawingml/2006/main" xmlns:r="http://schemas.openxmlformats.org/officeDocument/2006/relationships" xmlns:p="http://schemas.openxmlformats.org/presentationml/2006/main">
+  <p:cSld>
+    <p:spTree>
+      <p:nvGrpSpPr>
+        <p:cNvPr id="1" name=""/>
+        <p:cNvGrpSpPr/>
+        <p:nvPr/>
+      </p:nvGrpSpPr>
+      <p:grpSpPr>
+        <a:xfrm>
+          <a:off x="0" y="0"/>
+          <a:ext cx="0" cy="0"/>
+          <a:chOff x="0" y="0"/>
+          <a:chExt cx="0" cy="0"/>
+        </a:xfrm>
+      </p:grpSpPr>
+      <p:sp>
+        <p:nvSpPr>
+          <p:cNvPr id="2" name="Título 1">
+            <a:extLst>
+              <a:ext uri="{FF2B5EF4-FFF2-40B4-BE49-F238E27FC236}">
+                <a16:creationId xmlns:a16="http://schemas.microsoft.com/office/drawing/2014/main" id="{445AF6CE-73FA-4293-87B1-65DE61BB1CCF}"/>
+              </a:ext>
+            </a:extLst>
+          </p:cNvPr>
+          <p:cNvSpPr>
+            <a:spLocks noGrp="1"/>
+          </p:cNvSpPr>
+          <p:nvPr>
+            <p:ph type="title"/>
+          </p:nvPr>
+        </p:nvSpPr>
+        <p:spPr/>
+        <p:txBody>
+          <a:bodyPr/>
+          <a:lstStyle/>
+          <a:p>
+            <a:endParaRPr lang="es-MX"/>
+          </a:p>
+        </p:txBody>
+      </p:sp>
+      <p:sp>
+        <p:nvSpPr>
+          <p:cNvPr id="3" name="Marcador de contenido 2">
+            <a:extLst>
+              <a:ext uri="{FF2B5EF4-FFF2-40B4-BE49-F238E27FC236}">
+                <a16:creationId xmlns:a16="http://schemas.microsoft.com/office/drawing/2014/main" id="{58FF9041-0D58-472D-A12F-951E52154C5C}"/>
+              </a:ext>
+            </a:extLst>
+          </p:cNvPr>
+          <p:cNvSpPr>
+            <a:spLocks noGrp="1"/>
+          </p:cNvSpPr>
+          <p:nvPr>
+            <p:ph idx="1"/>
+          </p:nvPr>
+        </p:nvSpPr>
+        <p:spPr/>
+        <p:txBody>
+          <a:bodyPr/>
+          <a:lstStyle/>
+          <a:p>
+            <a:endParaRPr lang="es-MX"/>
+          </a:p>
+        </p:txBody>
+      </p:sp>
+    </p:spTree>
+    <p:extLst>
+      <p:ext uri="{BB962C8B-B14F-4D97-AF65-F5344CB8AC3E}">
+        <p14:creationId xmlns:p14="http://schemas.microsoft.com/office/powerpoint/2010/main" val="1782876855"/>
+      </p:ext>
+    </p:extLst>
+  </p:cSld>
+  <p:clrMapOvr>
+    <a:masterClrMapping/>
+  </p:clrMapOvr>
+</p:sld>
+</file>
+
+<file path=ppt/slides/slide29.xml><?xml version="1.0" encoding="utf-8"?>
+<p:sld xmlns:a="http://schemas.openxmlformats.org/drawingml/2006/main" xmlns:r="http://schemas.openxmlformats.org/officeDocument/2006/relationships" xmlns:p="http://schemas.openxmlformats.org/presentationml/2006/main">
+  <p:cSld>
+    <p:spTree>
+      <p:nvGrpSpPr>
+        <p:cNvPr id="1" name=""/>
+        <p:cNvGrpSpPr/>
+        <p:nvPr/>
+      </p:nvGrpSpPr>
+      <p:grpSpPr>
+        <a:xfrm>
+          <a:off x="0" y="0"/>
+          <a:ext cx="0" cy="0"/>
+          <a:chOff x="0" y="0"/>
+          <a:chExt cx="0" cy="0"/>
+        </a:xfrm>
+      </p:grpSpPr>
+      <p:sp>
+        <p:nvSpPr>
+          <p:cNvPr id="2" name="Título 1">
+            <a:extLst>
+              <a:ext uri="{FF2B5EF4-FFF2-40B4-BE49-F238E27FC236}">
+                <a16:creationId xmlns:a16="http://schemas.microsoft.com/office/drawing/2014/main" id="{E10A57B0-E30A-4B0E-AC7C-19D35DF8BDFC}"/>
+              </a:ext>
+            </a:extLst>
+          </p:cNvPr>
+          <p:cNvSpPr>
+            <a:spLocks noGrp="1"/>
+          </p:cNvSpPr>
+          <p:nvPr>
+            <p:ph type="title"/>
+          </p:nvPr>
+        </p:nvSpPr>
+        <p:spPr/>
+        <p:txBody>
+          <a:bodyPr/>
+          <a:lstStyle/>
+          <a:p>
+            <a:endParaRPr lang="es-MX"/>
+          </a:p>
+        </p:txBody>
+      </p:sp>
+      <p:sp>
+        <p:nvSpPr>
+          <p:cNvPr id="3" name="Marcador de contenido 2">
+            <a:extLst>
+              <a:ext uri="{FF2B5EF4-FFF2-40B4-BE49-F238E27FC236}">
+                <a16:creationId xmlns:a16="http://schemas.microsoft.com/office/drawing/2014/main" id="{9DB6CA18-B55F-4852-8D41-962C8E6E0DBB}"/>
+              </a:ext>
+            </a:extLst>
+          </p:cNvPr>
+          <p:cNvSpPr>
+            <a:spLocks noGrp="1"/>
+          </p:cNvSpPr>
+          <p:nvPr>
+            <p:ph idx="1"/>
+          </p:nvPr>
+        </p:nvSpPr>
+        <p:spPr/>
+        <p:txBody>
+          <a:bodyPr/>
+          <a:lstStyle/>
+          <a:p>
+            <a:endParaRPr lang="es-MX"/>
+          </a:p>
+        </p:txBody>
+      </p:sp>
+    </p:spTree>
+    <p:extLst>
+      <p:ext uri="{BB962C8B-B14F-4D97-AF65-F5344CB8AC3E}">
+        <p14:creationId xmlns:p14="http://schemas.microsoft.com/office/powerpoint/2010/main" val="3582621404"/>
       </p:ext>
     </p:extLst>
   </p:cSld>

</xml_diff>